<commit_message>
Added a little to potential energy
</commit_message>
<xml_diff>
--- a/tex/figures/PotentialECons/Figures.pptx
+++ b/tex/figures/PotentialECons/Figures.pptx
@@ -244,7 +244,7 @@
           <a:p>
             <a:fld id="{F7249F8D-641B-4CAF-BAE5-10524742F6F1}" type="datetimeFigureOut">
               <a:rPr lang="en-CA" smtClean="0"/>
-              <a:t>2018-06-07</a:t>
+              <a:t>2018-06-08</a:t>
             </a:fld>
             <a:endParaRPr lang="en-CA"/>
           </a:p>
@@ -414,7 +414,7 @@
           <a:p>
             <a:fld id="{F7249F8D-641B-4CAF-BAE5-10524742F6F1}" type="datetimeFigureOut">
               <a:rPr lang="en-CA" smtClean="0"/>
-              <a:t>2018-06-07</a:t>
+              <a:t>2018-06-08</a:t>
             </a:fld>
             <a:endParaRPr lang="en-CA"/>
           </a:p>
@@ -594,7 +594,7 @@
           <a:p>
             <a:fld id="{F7249F8D-641B-4CAF-BAE5-10524742F6F1}" type="datetimeFigureOut">
               <a:rPr lang="en-CA" smtClean="0"/>
-              <a:t>2018-06-07</a:t>
+              <a:t>2018-06-08</a:t>
             </a:fld>
             <a:endParaRPr lang="en-CA"/>
           </a:p>
@@ -764,7 +764,7 @@
           <a:p>
             <a:fld id="{F7249F8D-641B-4CAF-BAE5-10524742F6F1}" type="datetimeFigureOut">
               <a:rPr lang="en-CA" smtClean="0"/>
-              <a:t>2018-06-07</a:t>
+              <a:t>2018-06-08</a:t>
             </a:fld>
             <a:endParaRPr lang="en-CA"/>
           </a:p>
@@ -1010,7 +1010,7 @@
           <a:p>
             <a:fld id="{F7249F8D-641B-4CAF-BAE5-10524742F6F1}" type="datetimeFigureOut">
               <a:rPr lang="en-CA" smtClean="0"/>
-              <a:t>2018-06-07</a:t>
+              <a:t>2018-06-08</a:t>
             </a:fld>
             <a:endParaRPr lang="en-CA"/>
           </a:p>
@@ -1242,7 +1242,7 @@
           <a:p>
             <a:fld id="{F7249F8D-641B-4CAF-BAE5-10524742F6F1}" type="datetimeFigureOut">
               <a:rPr lang="en-CA" smtClean="0"/>
-              <a:t>2018-06-07</a:t>
+              <a:t>2018-06-08</a:t>
             </a:fld>
             <a:endParaRPr lang="en-CA"/>
           </a:p>
@@ -1609,7 +1609,7 @@
           <a:p>
             <a:fld id="{F7249F8D-641B-4CAF-BAE5-10524742F6F1}" type="datetimeFigureOut">
               <a:rPr lang="en-CA" smtClean="0"/>
-              <a:t>2018-06-07</a:t>
+              <a:t>2018-06-08</a:t>
             </a:fld>
             <a:endParaRPr lang="en-CA"/>
           </a:p>
@@ -1727,7 +1727,7 @@
           <a:p>
             <a:fld id="{F7249F8D-641B-4CAF-BAE5-10524742F6F1}" type="datetimeFigureOut">
               <a:rPr lang="en-CA" smtClean="0"/>
-              <a:t>2018-06-07</a:t>
+              <a:t>2018-06-08</a:t>
             </a:fld>
             <a:endParaRPr lang="en-CA"/>
           </a:p>
@@ -1822,7 +1822,7 @@
           <a:p>
             <a:fld id="{F7249F8D-641B-4CAF-BAE5-10524742F6F1}" type="datetimeFigureOut">
               <a:rPr lang="en-CA" smtClean="0"/>
-              <a:t>2018-06-07</a:t>
+              <a:t>2018-06-08</a:t>
             </a:fld>
             <a:endParaRPr lang="en-CA"/>
           </a:p>
@@ -2099,7 +2099,7 @@
           <a:p>
             <a:fld id="{F7249F8D-641B-4CAF-BAE5-10524742F6F1}" type="datetimeFigureOut">
               <a:rPr lang="en-CA" smtClean="0"/>
-              <a:t>2018-06-07</a:t>
+              <a:t>2018-06-08</a:t>
             </a:fld>
             <a:endParaRPr lang="en-CA"/>
           </a:p>
@@ -2352,7 +2352,7 @@
           <a:p>
             <a:fld id="{F7249F8D-641B-4CAF-BAE5-10524742F6F1}" type="datetimeFigureOut">
               <a:rPr lang="en-CA" smtClean="0"/>
-              <a:t>2018-06-07</a:t>
+              <a:t>2018-06-08</a:t>
             </a:fld>
             <a:endParaRPr lang="en-CA"/>
           </a:p>
@@ -2565,7 +2565,7 @@
           <a:p>
             <a:fld id="{F7249F8D-641B-4CAF-BAE5-10524742F6F1}" type="datetimeFigureOut">
               <a:rPr lang="en-CA" smtClean="0"/>
-              <a:t>2018-06-07</a:t>
+              <a:t>2018-06-08</a:t>
             </a:fld>
             <a:endParaRPr lang="en-CA"/>
           </a:p>
@@ -4619,8 +4619,8 @@
               </a:fontRef>
             </p:style>
           </p:cxnSp>
-          <mc:AlternateContent xmlns:mc="http://schemas.openxmlformats.org/markup-compatibility/2006">
-            <mc:Choice xmlns:a14="http://schemas.microsoft.com/office/drawing/2010/main" Requires="a14">
+          <mc:AlternateContent xmlns:mc="http://schemas.openxmlformats.org/markup-compatibility/2006" xmlns:a14="http://schemas.microsoft.com/office/drawing/2010/main">
+            <mc:Choice Requires="a14">
               <p:sp>
                 <p:nvSpPr>
                   <p:cNvPr id="12" name="TextBox 11"/>
@@ -4643,6 +4643,7 @@
                   </a:bodyPr>
                   <a:lstStyle/>
                   <a:p>
+                    <a:pPr/>
                     <a14:m>
                       <m:oMathPara xmlns:m="http://schemas.openxmlformats.org/officeDocument/2006/math">
                         <m:oMathParaPr>
@@ -4701,7 +4702,7 @@
                 </p:txBody>
               </p:sp>
             </mc:Choice>
-            <mc:Fallback>
+            <mc:Fallback xmlns="">
               <p:sp>
                 <p:nvSpPr>
                   <p:cNvPr id="12" name="TextBox 11"/>
@@ -4740,8 +4741,8 @@
               </p:sp>
             </mc:Fallback>
           </mc:AlternateContent>
-          <mc:AlternateContent xmlns:mc="http://schemas.openxmlformats.org/markup-compatibility/2006">
-            <mc:Choice xmlns:a14="http://schemas.microsoft.com/office/drawing/2010/main" Requires="a14">
+          <mc:AlternateContent xmlns:mc="http://schemas.openxmlformats.org/markup-compatibility/2006" xmlns:a14="http://schemas.microsoft.com/office/drawing/2010/main">
+            <mc:Choice Requires="a14">
               <p:sp>
                 <p:nvSpPr>
                   <p:cNvPr id="14" name="TextBox 13"/>
@@ -4764,6 +4765,7 @@
                   </a:bodyPr>
                   <a:lstStyle/>
                   <a:p>
+                    <a:pPr/>
                     <a14:m>
                       <m:oMathPara xmlns:m="http://schemas.openxmlformats.org/officeDocument/2006/math">
                         <m:oMathParaPr>
@@ -4822,7 +4824,7 @@
                 </p:txBody>
               </p:sp>
             </mc:Choice>
-            <mc:Fallback>
+            <mc:Fallback xmlns="">
               <p:sp>
                 <p:nvSpPr>
                   <p:cNvPr id="14" name="TextBox 13"/>
@@ -4933,8 +4935,8 @@
               </a:fontRef>
             </p:style>
           </p:cxnSp>
-          <mc:AlternateContent xmlns:mc="http://schemas.openxmlformats.org/markup-compatibility/2006">
-            <mc:Choice xmlns:a14="http://schemas.microsoft.com/office/drawing/2010/main" Requires="a14">
+          <mc:AlternateContent xmlns:mc="http://schemas.openxmlformats.org/markup-compatibility/2006" xmlns:a14="http://schemas.microsoft.com/office/drawing/2010/main">
+            <mc:Choice Requires="a14">
               <p:sp>
                 <p:nvSpPr>
                   <p:cNvPr id="22" name="TextBox 21"/>
@@ -4957,6 +4959,7 @@
                   </a:bodyPr>
                   <a:lstStyle/>
                   <a:p>
+                    <a:pPr/>
                     <a14:m>
                       <m:oMathPara xmlns:m="http://schemas.openxmlformats.org/officeDocument/2006/math">
                         <m:oMathParaPr>
@@ -5015,7 +5018,7 @@
                 </p:txBody>
               </p:sp>
             </mc:Choice>
-            <mc:Fallback>
+            <mc:Fallback xmlns="">
               <p:sp>
                 <p:nvSpPr>
                   <p:cNvPr id="22" name="TextBox 21"/>
@@ -5054,8 +5057,8 @@
               </p:sp>
             </mc:Fallback>
           </mc:AlternateContent>
-          <mc:AlternateContent xmlns:mc="http://schemas.openxmlformats.org/markup-compatibility/2006">
-            <mc:Choice xmlns:a14="http://schemas.microsoft.com/office/drawing/2010/main" Requires="a14">
+          <mc:AlternateContent xmlns:mc="http://schemas.openxmlformats.org/markup-compatibility/2006" xmlns:a14="http://schemas.microsoft.com/office/drawing/2010/main">
+            <mc:Choice Requires="a14">
               <p:sp>
                 <p:nvSpPr>
                   <p:cNvPr id="23" name="TextBox 22"/>
@@ -5078,6 +5081,7 @@
                   </a:bodyPr>
                   <a:lstStyle/>
                   <a:p>
+                    <a:pPr/>
                     <a14:m>
                       <m:oMathPara xmlns:m="http://schemas.openxmlformats.org/officeDocument/2006/math">
                         <m:oMathParaPr>
@@ -5136,7 +5140,7 @@
                 </p:txBody>
               </p:sp>
             </mc:Choice>
-            <mc:Fallback>
+            <mc:Fallback xmlns="">
               <p:sp>
                 <p:nvSpPr>
                   <p:cNvPr id="23" name="TextBox 22"/>
@@ -5213,8 +5217,8 @@
             </a:fontRef>
           </p:style>
         </p:cxnSp>
-        <mc:AlternateContent xmlns:mc="http://schemas.openxmlformats.org/markup-compatibility/2006">
-          <mc:Choice xmlns:a14="http://schemas.microsoft.com/office/drawing/2010/main" Requires="a14">
+        <mc:AlternateContent xmlns:mc="http://schemas.openxmlformats.org/markup-compatibility/2006" xmlns:a14="http://schemas.microsoft.com/office/drawing/2010/main">
+          <mc:Choice Requires="a14">
             <p:sp>
               <p:nvSpPr>
                 <p:cNvPr id="27" name="TextBox 26"/>
@@ -5237,6 +5241,7 @@
                 </a:bodyPr>
                 <a:lstStyle/>
                 <a:p>
+                  <a:pPr/>
                   <a14:m>
                     <m:oMathPara xmlns:m="http://schemas.openxmlformats.org/officeDocument/2006/math">
                       <m:oMathParaPr>
@@ -5261,7 +5266,7 @@
               </p:txBody>
             </p:sp>
           </mc:Choice>
-          <mc:Fallback>
+          <mc:Fallback xmlns="">
             <p:sp>
               <p:nvSpPr>
                 <p:cNvPr id="27" name="TextBox 26"/>
@@ -5803,8 +5808,8 @@
               </a:p>
             </p:txBody>
           </p:sp>
-          <mc:AlternateContent xmlns:mc="http://schemas.openxmlformats.org/markup-compatibility/2006">
-            <mc:Choice xmlns:a14="http://schemas.microsoft.com/office/drawing/2010/main" Requires="a14">
+          <mc:AlternateContent xmlns:mc="http://schemas.openxmlformats.org/markup-compatibility/2006" xmlns:a14="http://schemas.microsoft.com/office/drawing/2010/main">
+            <mc:Choice Requires="a14">
               <p:sp>
                 <p:nvSpPr>
                   <p:cNvPr id="33" name="TextBox 32"/>
@@ -5852,7 +5857,7 @@
                 </p:txBody>
               </p:sp>
             </mc:Choice>
-            <mc:Fallback>
+            <mc:Fallback xmlns="">
               <p:sp>
                 <p:nvSpPr>
                   <p:cNvPr id="33" name="TextBox 32"/>
@@ -5891,8 +5896,8 @@
               </p:sp>
             </mc:Fallback>
           </mc:AlternateContent>
-          <mc:AlternateContent xmlns:mc="http://schemas.openxmlformats.org/markup-compatibility/2006">
-            <mc:Choice xmlns:a14="http://schemas.microsoft.com/office/drawing/2010/main" Requires="a14">
+          <mc:AlternateContent xmlns:mc="http://schemas.openxmlformats.org/markup-compatibility/2006" xmlns:a14="http://schemas.microsoft.com/office/drawing/2010/main">
+            <mc:Choice Requires="a14">
               <p:sp>
                 <p:nvSpPr>
                   <p:cNvPr id="34" name="TextBox 33"/>
@@ -5940,7 +5945,7 @@
                 </p:txBody>
               </p:sp>
             </mc:Choice>
-            <mc:Fallback>
+            <mc:Fallback xmlns="">
               <p:sp>
                 <p:nvSpPr>
                   <p:cNvPr id="34" name="TextBox 33"/>
@@ -5979,8 +5984,8 @@
               </p:sp>
             </mc:Fallback>
           </mc:AlternateContent>
-          <mc:AlternateContent xmlns:mc="http://schemas.openxmlformats.org/markup-compatibility/2006">
-            <mc:Choice xmlns:a14="http://schemas.microsoft.com/office/drawing/2010/main" Requires="a14">
+          <mc:AlternateContent xmlns:mc="http://schemas.openxmlformats.org/markup-compatibility/2006" xmlns:a14="http://schemas.microsoft.com/office/drawing/2010/main">
+            <mc:Choice Requires="a14">
               <p:sp>
                 <p:nvSpPr>
                   <p:cNvPr id="35" name="TextBox 34"/>
@@ -6075,7 +6080,7 @@
                 </p:txBody>
               </p:sp>
             </mc:Choice>
-            <mc:Fallback>
+            <mc:Fallback xmlns="">
               <p:sp>
                 <p:nvSpPr>
                   <p:cNvPr id="35" name="TextBox 34"/>
@@ -6150,8 +6155,8 @@
               </a:fontRef>
             </p:style>
           </p:cxnSp>
-          <mc:AlternateContent xmlns:mc="http://schemas.openxmlformats.org/markup-compatibility/2006">
-            <mc:Choice xmlns:a14="http://schemas.microsoft.com/office/drawing/2010/main" Requires="a14">
+          <mc:AlternateContent xmlns:mc="http://schemas.openxmlformats.org/markup-compatibility/2006" xmlns:a14="http://schemas.microsoft.com/office/drawing/2010/main">
+            <mc:Choice Requires="a14">
               <p:sp>
                 <p:nvSpPr>
                   <p:cNvPr id="41" name="TextBox 40"/>
@@ -6231,7 +6236,7 @@
                 </p:txBody>
               </p:sp>
             </mc:Choice>
-            <mc:Fallback>
+            <mc:Fallback xmlns="">
               <p:sp>
                 <p:nvSpPr>
                   <p:cNvPr id="41" name="TextBox 40"/>
@@ -6348,8 +6353,8 @@
               </a:fontRef>
             </p:style>
           </p:cxnSp>
-          <mc:AlternateContent xmlns:mc="http://schemas.openxmlformats.org/markup-compatibility/2006">
-            <mc:Choice xmlns:a14="http://schemas.microsoft.com/office/drawing/2010/main" Requires="a14">
+          <mc:AlternateContent xmlns:mc="http://schemas.openxmlformats.org/markup-compatibility/2006" xmlns:a14="http://schemas.microsoft.com/office/drawing/2010/main">
+            <mc:Choice Requires="a14">
               <p:sp>
                 <p:nvSpPr>
                   <p:cNvPr id="56" name="TextBox 55"/>
@@ -6372,6 +6377,7 @@
                   </a:bodyPr>
                   <a:lstStyle/>
                   <a:p>
+                    <a:pPr/>
                     <a14:m>
                       <m:oMathPara xmlns:m="http://schemas.openxmlformats.org/officeDocument/2006/math">
                         <m:oMathParaPr>
@@ -6430,7 +6436,7 @@
                 </p:txBody>
               </p:sp>
             </mc:Choice>
-            <mc:Fallback>
+            <mc:Fallback xmlns="">
               <p:sp>
                 <p:nvSpPr>
                   <p:cNvPr id="56" name="TextBox 55"/>
@@ -6469,8 +6475,8 @@
               </p:sp>
             </mc:Fallback>
           </mc:AlternateContent>
-          <mc:AlternateContent xmlns:mc="http://schemas.openxmlformats.org/markup-compatibility/2006">
-            <mc:Choice xmlns:a14="http://schemas.microsoft.com/office/drawing/2010/main" Requires="a14">
+          <mc:AlternateContent xmlns:mc="http://schemas.openxmlformats.org/markup-compatibility/2006" xmlns:a14="http://schemas.microsoft.com/office/drawing/2010/main">
+            <mc:Choice Requires="a14">
               <p:sp>
                 <p:nvSpPr>
                   <p:cNvPr id="57" name="TextBox 56"/>
@@ -6493,6 +6499,7 @@
                   </a:bodyPr>
                   <a:lstStyle/>
                   <a:p>
+                    <a:pPr/>
                     <a14:m>
                       <m:oMathPara xmlns:m="http://schemas.openxmlformats.org/officeDocument/2006/math">
                         <m:oMathParaPr>
@@ -6551,7 +6558,7 @@
                 </p:txBody>
               </p:sp>
             </mc:Choice>
-            <mc:Fallback>
+            <mc:Fallback xmlns="">
               <p:sp>
                 <p:nvSpPr>
                   <p:cNvPr id="57" name="TextBox 56"/>
@@ -6626,8 +6633,8 @@
               </a:fontRef>
             </p:style>
           </p:cxnSp>
-          <mc:AlternateContent xmlns:mc="http://schemas.openxmlformats.org/markup-compatibility/2006">
-            <mc:Choice xmlns:a14="http://schemas.microsoft.com/office/drawing/2010/main" Requires="a14">
+          <mc:AlternateContent xmlns:mc="http://schemas.openxmlformats.org/markup-compatibility/2006" xmlns:a14="http://schemas.microsoft.com/office/drawing/2010/main">
+            <mc:Choice Requires="a14">
               <p:sp>
                 <p:nvSpPr>
                   <p:cNvPr id="61" name="TextBox 60"/>
@@ -6650,6 +6657,7 @@
                   </a:bodyPr>
                   <a:lstStyle/>
                   <a:p>
+                    <a:pPr/>
                     <a14:m>
                       <m:oMathPara xmlns:m="http://schemas.openxmlformats.org/officeDocument/2006/math">
                         <m:oMathParaPr>
@@ -6727,7 +6735,7 @@
                 </p:txBody>
               </p:sp>
             </mc:Choice>
-            <mc:Fallback>
+            <mc:Fallback xmlns="">
               <p:sp>
                 <p:nvSpPr>
                   <p:cNvPr id="61" name="TextBox 60"/>
@@ -6766,8 +6774,8 @@
               </p:sp>
             </mc:Fallback>
           </mc:AlternateContent>
-          <mc:AlternateContent xmlns:mc="http://schemas.openxmlformats.org/markup-compatibility/2006">
-            <mc:Choice xmlns:a14="http://schemas.microsoft.com/office/drawing/2010/main" Requires="a14">
+          <mc:AlternateContent xmlns:mc="http://schemas.openxmlformats.org/markup-compatibility/2006" xmlns:a14="http://schemas.microsoft.com/office/drawing/2010/main">
+            <mc:Choice Requires="a14">
               <p:sp>
                 <p:nvSpPr>
                   <p:cNvPr id="62" name="TextBox 61"/>
@@ -6790,6 +6798,7 @@
                   </a:bodyPr>
                   <a:lstStyle/>
                   <a:p>
+                    <a:pPr/>
                     <a14:m>
                       <m:oMathPara xmlns:m="http://schemas.openxmlformats.org/officeDocument/2006/math">
                         <m:oMathParaPr>
@@ -6867,7 +6876,7 @@
                 </p:txBody>
               </p:sp>
             </mc:Choice>
-            <mc:Fallback>
+            <mc:Fallback xmlns="">
               <p:sp>
                 <p:nvSpPr>
                   <p:cNvPr id="62" name="TextBox 61"/>
@@ -7011,6 +7020,1232 @@
             </a:p>
           </p:txBody>
         </p:sp>
+      </p:grpSp>
+      <p:grpSp>
+        <p:nvGrpSpPr>
+          <p:cNvPr id="60" name="Group 59"/>
+          <p:cNvGrpSpPr/>
+          <p:nvPr/>
+        </p:nvGrpSpPr>
+        <p:grpSpPr>
+          <a:xfrm>
+            <a:off x="403452" y="3337931"/>
+            <a:ext cx="2142815" cy="3127992"/>
+            <a:chOff x="536230" y="3538209"/>
+            <a:chExt cx="2142815" cy="3127992"/>
+          </a:xfrm>
+        </p:grpSpPr>
+        <p:cxnSp>
+          <p:nvCxnSpPr>
+            <p:cNvPr id="3" name="Straight Arrow Connector 2"/>
+            <p:cNvCxnSpPr/>
+            <p:nvPr/>
+          </p:nvCxnSpPr>
+          <p:spPr>
+            <a:xfrm flipV="1">
+              <a:off x="925846" y="3548917"/>
+              <a:ext cx="7025" cy="3086060"/>
+            </a:xfrm>
+            <a:prstGeom prst="straightConnector1">
+              <a:avLst/>
+            </a:prstGeom>
+            <a:ln w="38100">
+              <a:solidFill>
+                <a:schemeClr val="tx1"/>
+              </a:solidFill>
+              <a:tailEnd type="triangle"/>
+            </a:ln>
+          </p:spPr>
+          <p:style>
+            <a:lnRef idx="1">
+              <a:schemeClr val="accent1"/>
+            </a:lnRef>
+            <a:fillRef idx="0">
+              <a:schemeClr val="accent1"/>
+            </a:fillRef>
+            <a:effectRef idx="0">
+              <a:schemeClr val="accent1"/>
+            </a:effectRef>
+            <a:fontRef idx="minor">
+              <a:schemeClr val="tx1"/>
+            </a:fontRef>
+          </p:style>
+        </p:cxnSp>
+        <mc:AlternateContent xmlns:mc="http://schemas.openxmlformats.org/markup-compatibility/2006">
+          <mc:Choice xmlns:a14="http://schemas.microsoft.com/office/drawing/2010/main" Requires="a14">
+            <p:sp>
+              <p:nvSpPr>
+                <p:cNvPr id="5" name="TextBox 4"/>
+                <p:cNvSpPr txBox="1"/>
+                <p:nvPr/>
+              </p:nvSpPr>
+              <p:spPr>
+                <a:xfrm>
+                  <a:off x="611265" y="3538209"/>
+                  <a:ext cx="198324" cy="307777"/>
+                </a:xfrm>
+                <a:prstGeom prst="rect">
+                  <a:avLst/>
+                </a:prstGeom>
+                <a:noFill/>
+              </p:spPr>
+              <p:txBody>
+                <a:bodyPr wrap="none" lIns="0" tIns="0" rIns="0" bIns="0" rtlCol="0">
+                  <a:spAutoFit/>
+                </a:bodyPr>
+                <a:lstStyle/>
+                <a:p>
+                  <a14:m>
+                    <m:oMathPara xmlns:m="http://schemas.openxmlformats.org/officeDocument/2006/math">
+                      <m:oMathParaPr>
+                        <m:jc m:val="centerGroup"/>
+                      </m:oMathParaPr>
+                      <m:oMath xmlns:m="http://schemas.openxmlformats.org/officeDocument/2006/math">
+                        <m:r>
+                          <a:rPr lang="en-US" sz="2000" b="0" i="1" smtClean="0">
+                            <a:latin typeface="Cambria Math" panose="02040503050406030204" pitchFamily="18" charset="0"/>
+                            <a:cs typeface="Arial" panose="020B0604020202020204" pitchFamily="34" charset="0"/>
+                          </a:rPr>
+                          <m:t>𝑧</m:t>
+                        </m:r>
+                      </m:oMath>
+                    </m:oMathPara>
+                  </a14:m>
+                  <a:endParaRPr lang="en-US" sz="2000" dirty="0" smtClean="0">
+                    <a:latin typeface="Arial" panose="020B0604020202020204" pitchFamily="34" charset="0"/>
+                    <a:cs typeface="Arial" panose="020B0604020202020204" pitchFamily="34" charset="0"/>
+                  </a:endParaRPr>
+                </a:p>
+              </p:txBody>
+            </p:sp>
+          </mc:Choice>
+          <mc:Fallback>
+            <p:sp>
+              <p:nvSpPr>
+                <p:cNvPr id="5" name="TextBox 4"/>
+                <p:cNvSpPr txBox="1">
+                  <a:spLocks noRot="1" noChangeAspect="1" noMove="1" noResize="1" noEditPoints="1" noAdjustHandles="1" noChangeArrowheads="1" noChangeShapeType="1" noTextEdit="1"/>
+                </p:cNvSpPr>
+                <p:nvPr/>
+              </p:nvSpPr>
+              <p:spPr>
+                <a:xfrm>
+                  <a:off x="611265" y="3538209"/>
+                  <a:ext cx="198324" cy="307777"/>
+                </a:xfrm>
+                <a:prstGeom prst="rect">
+                  <a:avLst/>
+                </a:prstGeom>
+                <a:blipFill>
+                  <a:blip r:embed="rId47"/>
+                  <a:stretch>
+                    <a:fillRect l="-12121" r="-12121" b="-2000"/>
+                  </a:stretch>
+                </a:blipFill>
+              </p:spPr>
+              <p:txBody>
+                <a:bodyPr/>
+                <a:lstStyle/>
+                <a:p>
+                  <a:r>
+                    <a:rPr lang="en-US">
+                      <a:noFill/>
+                    </a:rPr>
+                    <a:t> </a:t>
+                  </a:r>
+                </a:p>
+              </p:txBody>
+            </p:sp>
+          </mc:Fallback>
+        </mc:AlternateContent>
+        <p:sp>
+          <p:nvSpPr>
+            <p:cNvPr id="49" name="Oval 48"/>
+            <p:cNvSpPr/>
+            <p:nvPr/>
+          </p:nvSpPr>
+          <p:spPr>
+            <a:xfrm>
+              <a:off x="1273002" y="5785737"/>
+              <a:ext cx="120943" cy="119766"/>
+            </a:xfrm>
+            <a:prstGeom prst="ellipse">
+              <a:avLst/>
+            </a:prstGeom>
+            <a:solidFill>
+              <a:schemeClr val="tx1"/>
+            </a:solidFill>
+            <a:ln w="38100">
+              <a:solidFill>
+                <a:schemeClr val="tx1"/>
+              </a:solidFill>
+            </a:ln>
+          </p:spPr>
+          <p:style>
+            <a:lnRef idx="2">
+              <a:schemeClr val="accent1">
+                <a:shade val="50000"/>
+              </a:schemeClr>
+            </a:lnRef>
+            <a:fillRef idx="1">
+              <a:schemeClr val="accent1"/>
+            </a:fillRef>
+            <a:effectRef idx="0">
+              <a:schemeClr val="accent1"/>
+            </a:effectRef>
+            <a:fontRef idx="minor">
+              <a:schemeClr val="lt1"/>
+            </a:fontRef>
+          </p:style>
+          <p:txBody>
+            <a:bodyPr rtlCol="0" anchor="ctr"/>
+            <a:lstStyle/>
+            <a:p>
+              <a:pPr algn="ctr"/>
+              <a:endParaRPr lang="en-US"/>
+            </a:p>
+          </p:txBody>
+        </p:sp>
+        <p:sp>
+          <p:nvSpPr>
+            <p:cNvPr id="52" name="Oval 51"/>
+            <p:cNvSpPr/>
+            <p:nvPr/>
+          </p:nvSpPr>
+          <p:spPr>
+            <a:xfrm>
+              <a:off x="1273003" y="4104991"/>
+              <a:ext cx="120943" cy="119766"/>
+            </a:xfrm>
+            <a:prstGeom prst="ellipse">
+              <a:avLst/>
+            </a:prstGeom>
+            <a:solidFill>
+              <a:schemeClr val="tx1"/>
+            </a:solidFill>
+            <a:ln w="38100">
+              <a:solidFill>
+                <a:schemeClr val="tx1"/>
+              </a:solidFill>
+            </a:ln>
+          </p:spPr>
+          <p:style>
+            <a:lnRef idx="2">
+              <a:schemeClr val="accent1">
+                <a:shade val="50000"/>
+              </a:schemeClr>
+            </a:lnRef>
+            <a:fillRef idx="1">
+              <a:schemeClr val="accent1"/>
+            </a:fillRef>
+            <a:effectRef idx="0">
+              <a:schemeClr val="accent1"/>
+            </a:effectRef>
+            <a:fontRef idx="minor">
+              <a:schemeClr val="lt1"/>
+            </a:fontRef>
+          </p:style>
+          <p:txBody>
+            <a:bodyPr rtlCol="0" anchor="ctr"/>
+            <a:lstStyle/>
+            <a:p>
+              <a:pPr algn="ctr"/>
+              <a:endParaRPr lang="en-US"/>
+            </a:p>
+          </p:txBody>
+        </p:sp>
+        <p:cxnSp>
+          <p:nvCxnSpPr>
+            <p:cNvPr id="10" name="Straight Connector 9"/>
+            <p:cNvCxnSpPr>
+              <a:stCxn id="49" idx="4"/>
+            </p:cNvCxnSpPr>
+            <p:nvPr/>
+          </p:nvCxnSpPr>
+          <p:spPr>
+            <a:xfrm flipH="1" flipV="1">
+              <a:off x="1328375" y="4173905"/>
+              <a:ext cx="5099" cy="1731598"/>
+            </a:xfrm>
+            <a:prstGeom prst="line">
+              <a:avLst/>
+            </a:prstGeom>
+            <a:ln w="38100">
+              <a:solidFill>
+                <a:schemeClr val="tx1"/>
+              </a:solidFill>
+              <a:prstDash val="sysDot"/>
+            </a:ln>
+          </p:spPr>
+          <p:style>
+            <a:lnRef idx="1">
+              <a:schemeClr val="accent1"/>
+            </a:lnRef>
+            <a:fillRef idx="0">
+              <a:schemeClr val="accent1"/>
+            </a:fillRef>
+            <a:effectRef idx="0">
+              <a:schemeClr val="accent1"/>
+            </a:effectRef>
+            <a:fontRef idx="minor">
+              <a:schemeClr val="tx1"/>
+            </a:fontRef>
+          </p:style>
+        </p:cxnSp>
+        <mc:AlternateContent xmlns:mc="http://schemas.openxmlformats.org/markup-compatibility/2006">
+          <mc:Choice xmlns:a14="http://schemas.microsoft.com/office/drawing/2010/main" Requires="a14">
+            <p:sp>
+              <p:nvSpPr>
+                <p:cNvPr id="15" name="TextBox 14"/>
+                <p:cNvSpPr txBox="1"/>
+                <p:nvPr/>
+              </p:nvSpPr>
+              <p:spPr>
+                <a:xfrm>
+                  <a:off x="1467834" y="5845620"/>
+                  <a:ext cx="234936" cy="307777"/>
+                </a:xfrm>
+                <a:prstGeom prst="rect">
+                  <a:avLst/>
+                </a:prstGeom>
+                <a:noFill/>
+              </p:spPr>
+              <p:txBody>
+                <a:bodyPr wrap="none" lIns="0" tIns="0" rIns="0" bIns="0" rtlCol="0">
+                  <a:spAutoFit/>
+                </a:bodyPr>
+                <a:lstStyle/>
+                <a:p>
+                  <a14:m>
+                    <m:oMathPara xmlns:m="http://schemas.openxmlformats.org/officeDocument/2006/math">
+                      <m:oMathParaPr>
+                        <m:jc m:val="centerGroup"/>
+                      </m:oMathParaPr>
+                      <m:oMath xmlns:m="http://schemas.openxmlformats.org/officeDocument/2006/math">
+                        <m:r>
+                          <a:rPr lang="en-US" sz="2000" b="0" i="1" smtClean="0">
+                            <a:latin typeface="Cambria Math" panose="02040503050406030204" pitchFamily="18" charset="0"/>
+                            <a:cs typeface="Arial" panose="020B0604020202020204" pitchFamily="34" charset="0"/>
+                          </a:rPr>
+                          <m:t>𝐴</m:t>
+                        </m:r>
+                      </m:oMath>
+                    </m:oMathPara>
+                  </a14:m>
+                  <a:endParaRPr lang="en-US" sz="2000" dirty="0" smtClean="0">
+                    <a:latin typeface="Arial" panose="020B0604020202020204" pitchFamily="34" charset="0"/>
+                    <a:cs typeface="Arial" panose="020B0604020202020204" pitchFamily="34" charset="0"/>
+                  </a:endParaRPr>
+                </a:p>
+              </p:txBody>
+            </p:sp>
+          </mc:Choice>
+          <mc:Fallback>
+            <p:sp>
+              <p:nvSpPr>
+                <p:cNvPr id="15" name="TextBox 14"/>
+                <p:cNvSpPr txBox="1">
+                  <a:spLocks noRot="1" noChangeAspect="1" noMove="1" noResize="1" noEditPoints="1" noAdjustHandles="1" noChangeArrowheads="1" noChangeShapeType="1" noTextEdit="1"/>
+                </p:cNvSpPr>
+                <p:nvPr/>
+              </p:nvSpPr>
+              <p:spPr>
+                <a:xfrm>
+                  <a:off x="1467834" y="5845620"/>
+                  <a:ext cx="234936" cy="307777"/>
+                </a:xfrm>
+                <a:prstGeom prst="rect">
+                  <a:avLst/>
+                </a:prstGeom>
+                <a:blipFill>
+                  <a:blip r:embed="rId48"/>
+                  <a:stretch>
+                    <a:fillRect l="-20513" r="-23077" b="-9804"/>
+                  </a:stretch>
+                </a:blipFill>
+              </p:spPr>
+              <p:txBody>
+                <a:bodyPr/>
+                <a:lstStyle/>
+                <a:p>
+                  <a:r>
+                    <a:rPr lang="en-US">
+                      <a:noFill/>
+                    </a:rPr>
+                    <a:t> </a:t>
+                  </a:r>
+                </a:p>
+              </p:txBody>
+            </p:sp>
+          </mc:Fallback>
+        </mc:AlternateContent>
+        <mc:AlternateContent xmlns:mc="http://schemas.openxmlformats.org/markup-compatibility/2006">
+          <mc:Choice xmlns:a14="http://schemas.microsoft.com/office/drawing/2010/main" Requires="a14">
+            <p:sp>
+              <p:nvSpPr>
+                <p:cNvPr id="53" name="TextBox 52"/>
+                <p:cNvSpPr txBox="1"/>
+                <p:nvPr/>
+              </p:nvSpPr>
+              <p:spPr>
+                <a:xfrm>
+                  <a:off x="1467834" y="3815947"/>
+                  <a:ext cx="245708" cy="307777"/>
+                </a:xfrm>
+                <a:prstGeom prst="rect">
+                  <a:avLst/>
+                </a:prstGeom>
+                <a:noFill/>
+              </p:spPr>
+              <p:txBody>
+                <a:bodyPr wrap="none" lIns="0" tIns="0" rIns="0" bIns="0" rtlCol="0">
+                  <a:spAutoFit/>
+                </a:bodyPr>
+                <a:lstStyle/>
+                <a:p>
+                  <a14:m>
+                    <m:oMathPara xmlns:m="http://schemas.openxmlformats.org/officeDocument/2006/math">
+                      <m:oMathParaPr>
+                        <m:jc m:val="centerGroup"/>
+                      </m:oMathParaPr>
+                      <m:oMath xmlns:m="http://schemas.openxmlformats.org/officeDocument/2006/math">
+                        <m:r>
+                          <a:rPr lang="en-US" sz="2000" b="0" i="1" smtClean="0">
+                            <a:latin typeface="Cambria Math" panose="02040503050406030204" pitchFamily="18" charset="0"/>
+                            <a:cs typeface="Arial" panose="020B0604020202020204" pitchFamily="34" charset="0"/>
+                          </a:rPr>
+                          <m:t>𝐵</m:t>
+                        </m:r>
+                      </m:oMath>
+                    </m:oMathPara>
+                  </a14:m>
+                  <a:endParaRPr lang="en-US" sz="2000" dirty="0" smtClean="0">
+                    <a:latin typeface="Arial" panose="020B0604020202020204" pitchFamily="34" charset="0"/>
+                    <a:cs typeface="Arial" panose="020B0604020202020204" pitchFamily="34" charset="0"/>
+                  </a:endParaRPr>
+                </a:p>
+              </p:txBody>
+            </p:sp>
+          </mc:Choice>
+          <mc:Fallback>
+            <p:sp>
+              <p:nvSpPr>
+                <p:cNvPr id="53" name="TextBox 52"/>
+                <p:cNvSpPr txBox="1">
+                  <a:spLocks noRot="1" noChangeAspect="1" noMove="1" noResize="1" noEditPoints="1" noAdjustHandles="1" noChangeArrowheads="1" noChangeShapeType="1" noTextEdit="1"/>
+                </p:cNvSpPr>
+                <p:nvPr/>
+              </p:nvSpPr>
+              <p:spPr>
+                <a:xfrm>
+                  <a:off x="1467834" y="3815947"/>
+                  <a:ext cx="245708" cy="307777"/>
+                </a:xfrm>
+                <a:prstGeom prst="rect">
+                  <a:avLst/>
+                </a:prstGeom>
+                <a:blipFill>
+                  <a:blip r:embed="rId49"/>
+                  <a:stretch>
+                    <a:fillRect l="-20000" r="-22500" b="-9804"/>
+                  </a:stretch>
+                </a:blipFill>
+              </p:spPr>
+              <p:txBody>
+                <a:bodyPr/>
+                <a:lstStyle/>
+                <a:p>
+                  <a:r>
+                    <a:rPr lang="en-US">
+                      <a:noFill/>
+                    </a:rPr>
+                    <a:t> </a:t>
+                  </a:r>
+                </a:p>
+              </p:txBody>
+            </p:sp>
+          </mc:Fallback>
+        </mc:AlternateContent>
+        <p:cxnSp>
+          <p:nvCxnSpPr>
+            <p:cNvPr id="17" name="Straight Connector 16"/>
+            <p:cNvCxnSpPr/>
+            <p:nvPr/>
+          </p:nvCxnSpPr>
+          <p:spPr>
+            <a:xfrm>
+              <a:off x="832103" y="6512313"/>
+              <a:ext cx="201537" cy="0"/>
+            </a:xfrm>
+            <a:prstGeom prst="line">
+              <a:avLst/>
+            </a:prstGeom>
+            <a:ln w="38100">
+              <a:solidFill>
+                <a:schemeClr val="tx1"/>
+              </a:solidFill>
+            </a:ln>
+          </p:spPr>
+          <p:style>
+            <a:lnRef idx="1">
+              <a:schemeClr val="accent1"/>
+            </a:lnRef>
+            <a:fillRef idx="0">
+              <a:schemeClr val="accent1"/>
+            </a:fillRef>
+            <a:effectRef idx="0">
+              <a:schemeClr val="accent1"/>
+            </a:effectRef>
+            <a:fontRef idx="minor">
+              <a:schemeClr val="tx1"/>
+            </a:fontRef>
+          </p:style>
+        </p:cxnSp>
+        <mc:AlternateContent xmlns:mc="http://schemas.openxmlformats.org/markup-compatibility/2006">
+          <mc:Choice xmlns:a14="http://schemas.microsoft.com/office/drawing/2010/main" Requires="a14">
+            <p:sp>
+              <p:nvSpPr>
+                <p:cNvPr id="18" name="TextBox 17"/>
+                <p:cNvSpPr txBox="1"/>
+                <p:nvPr/>
+              </p:nvSpPr>
+              <p:spPr>
+                <a:xfrm>
+                  <a:off x="599246" y="6358424"/>
+                  <a:ext cx="213200" cy="307777"/>
+                </a:xfrm>
+                <a:prstGeom prst="rect">
+                  <a:avLst/>
+                </a:prstGeom>
+                <a:noFill/>
+              </p:spPr>
+              <p:txBody>
+                <a:bodyPr wrap="none" lIns="0" tIns="0" rIns="0" bIns="0" rtlCol="0">
+                  <a:spAutoFit/>
+                </a:bodyPr>
+                <a:lstStyle/>
+                <a:p>
+                  <a14:m>
+                    <m:oMathPara xmlns:m="http://schemas.openxmlformats.org/officeDocument/2006/math">
+                      <m:oMathParaPr>
+                        <m:jc m:val="centerGroup"/>
+                      </m:oMathParaPr>
+                      <m:oMath xmlns:m="http://schemas.openxmlformats.org/officeDocument/2006/math">
+                        <m:r>
+                          <a:rPr lang="en-US" sz="2000" b="0" i="1" smtClean="0">
+                            <a:latin typeface="Cambria Math" panose="02040503050406030204" pitchFamily="18" charset="0"/>
+                            <a:cs typeface="Arial" panose="020B0604020202020204" pitchFamily="34" charset="0"/>
+                          </a:rPr>
+                          <m:t>0</m:t>
+                        </m:r>
+                      </m:oMath>
+                    </m:oMathPara>
+                  </a14:m>
+                  <a:endParaRPr lang="en-US" sz="2000" dirty="0" smtClean="0">
+                    <a:latin typeface="Arial" panose="020B0604020202020204" pitchFamily="34" charset="0"/>
+                    <a:cs typeface="Arial" panose="020B0604020202020204" pitchFamily="34" charset="0"/>
+                  </a:endParaRPr>
+                </a:p>
+              </p:txBody>
+            </p:sp>
+          </mc:Choice>
+          <mc:Fallback>
+            <p:sp>
+              <p:nvSpPr>
+                <p:cNvPr id="18" name="TextBox 17"/>
+                <p:cNvSpPr txBox="1">
+                  <a:spLocks noRot="1" noChangeAspect="1" noMove="1" noResize="1" noEditPoints="1" noAdjustHandles="1" noChangeArrowheads="1" noChangeShapeType="1" noTextEdit="1"/>
+                </p:cNvSpPr>
+                <p:nvPr/>
+              </p:nvSpPr>
+              <p:spPr>
+                <a:xfrm>
+                  <a:off x="599246" y="6358424"/>
+                  <a:ext cx="213200" cy="307777"/>
+                </a:xfrm>
+                <a:prstGeom prst="rect">
+                  <a:avLst/>
+                </a:prstGeom>
+                <a:blipFill>
+                  <a:blip r:embed="rId50"/>
+                  <a:stretch>
+                    <a:fillRect l="-26471" r="-26471" b="-9804"/>
+                  </a:stretch>
+                </a:blipFill>
+              </p:spPr>
+              <p:txBody>
+                <a:bodyPr/>
+                <a:lstStyle/>
+                <a:p>
+                  <a:r>
+                    <a:rPr lang="en-US">
+                      <a:noFill/>
+                    </a:rPr>
+                    <a:t> </a:t>
+                  </a:r>
+                </a:p>
+              </p:txBody>
+            </p:sp>
+          </mc:Fallback>
+        </mc:AlternateContent>
+        <p:cxnSp>
+          <p:nvCxnSpPr>
+            <p:cNvPr id="55" name="Straight Connector 54"/>
+            <p:cNvCxnSpPr/>
+            <p:nvPr/>
+          </p:nvCxnSpPr>
+          <p:spPr>
+            <a:xfrm flipV="1">
+              <a:off x="907492" y="5845620"/>
+              <a:ext cx="386747" cy="1"/>
+            </a:xfrm>
+            <a:prstGeom prst="line">
+              <a:avLst/>
+            </a:prstGeom>
+            <a:ln w="19050">
+              <a:solidFill>
+                <a:schemeClr val="tx1"/>
+              </a:solidFill>
+              <a:prstDash val="sysDot"/>
+            </a:ln>
+          </p:spPr>
+          <p:style>
+            <a:lnRef idx="1">
+              <a:schemeClr val="accent1"/>
+            </a:lnRef>
+            <a:fillRef idx="0">
+              <a:schemeClr val="accent1"/>
+            </a:fillRef>
+            <a:effectRef idx="0">
+              <a:schemeClr val="accent1"/>
+            </a:effectRef>
+            <a:fontRef idx="minor">
+              <a:schemeClr val="tx1"/>
+            </a:fontRef>
+          </p:style>
+        </p:cxnSp>
+        <p:cxnSp>
+          <p:nvCxnSpPr>
+            <p:cNvPr id="59" name="Straight Connector 58"/>
+            <p:cNvCxnSpPr/>
+            <p:nvPr/>
+          </p:nvCxnSpPr>
+          <p:spPr>
+            <a:xfrm flipV="1">
+              <a:off x="955495" y="4164874"/>
+              <a:ext cx="386747" cy="1"/>
+            </a:xfrm>
+            <a:prstGeom prst="line">
+              <a:avLst/>
+            </a:prstGeom>
+            <a:ln w="19050">
+              <a:solidFill>
+                <a:schemeClr val="tx1"/>
+              </a:solidFill>
+              <a:prstDash val="sysDot"/>
+            </a:ln>
+          </p:spPr>
+          <p:style>
+            <a:lnRef idx="1">
+              <a:schemeClr val="accent1"/>
+            </a:lnRef>
+            <a:fillRef idx="0">
+              <a:schemeClr val="accent1"/>
+            </a:fillRef>
+            <a:effectRef idx="0">
+              <a:schemeClr val="accent1"/>
+            </a:effectRef>
+            <a:fontRef idx="minor">
+              <a:schemeClr val="tx1"/>
+            </a:fontRef>
+          </p:style>
+        </p:cxnSp>
+        <mc:AlternateContent xmlns:mc="http://schemas.openxmlformats.org/markup-compatibility/2006">
+          <mc:Choice xmlns:a14="http://schemas.microsoft.com/office/drawing/2010/main" Requires="a14">
+            <p:sp>
+              <p:nvSpPr>
+                <p:cNvPr id="40" name="TextBox 39"/>
+                <p:cNvSpPr txBox="1"/>
+                <p:nvPr/>
+              </p:nvSpPr>
+              <p:spPr>
+                <a:xfrm>
+                  <a:off x="536230" y="5631848"/>
+                  <a:ext cx="310790" cy="307777"/>
+                </a:xfrm>
+                <a:prstGeom prst="rect">
+                  <a:avLst/>
+                </a:prstGeom>
+                <a:noFill/>
+              </p:spPr>
+              <p:txBody>
+                <a:bodyPr wrap="none" lIns="0" tIns="0" rIns="0" bIns="0" rtlCol="0">
+                  <a:spAutoFit/>
+                </a:bodyPr>
+                <a:lstStyle/>
+                <a:p>
+                  <a14:m>
+                    <m:oMathPara xmlns:m="http://schemas.openxmlformats.org/officeDocument/2006/math">
+                      <m:oMathParaPr>
+                        <m:jc m:val="centerGroup"/>
+                      </m:oMathParaPr>
+                      <m:oMath xmlns:m="http://schemas.openxmlformats.org/officeDocument/2006/math">
+                        <m:sSub>
+                          <m:sSubPr>
+                            <m:ctrlPr>
+                              <a:rPr lang="en-US" sz="2000" b="0" i="1" smtClean="0">
+                                <a:latin typeface="Cambria Math" panose="02040503050406030204" pitchFamily="18" charset="0"/>
+                                <a:cs typeface="Arial" panose="020B0604020202020204" pitchFamily="34" charset="0"/>
+                              </a:rPr>
+                            </m:ctrlPr>
+                          </m:sSubPr>
+                          <m:e>
+                            <m:r>
+                              <a:rPr lang="en-US" sz="2000" b="0" i="1" smtClean="0">
+                                <a:latin typeface="Cambria Math" panose="02040503050406030204" pitchFamily="18" charset="0"/>
+                                <a:cs typeface="Arial" panose="020B0604020202020204" pitchFamily="34" charset="0"/>
+                              </a:rPr>
+                              <m:t>𝑧</m:t>
+                            </m:r>
+                          </m:e>
+                          <m:sub>
+                            <m:r>
+                              <a:rPr lang="en-US" sz="2000" b="0" i="1" smtClean="0">
+                                <a:latin typeface="Cambria Math" panose="02040503050406030204" pitchFamily="18" charset="0"/>
+                                <a:cs typeface="Arial" panose="020B0604020202020204" pitchFamily="34" charset="0"/>
+                              </a:rPr>
+                              <m:t>𝐴</m:t>
+                            </m:r>
+                          </m:sub>
+                        </m:sSub>
+                      </m:oMath>
+                    </m:oMathPara>
+                  </a14:m>
+                  <a:endParaRPr lang="en-US" sz="2000" b="0" dirty="0" smtClean="0">
+                    <a:latin typeface="Arial" panose="020B0604020202020204" pitchFamily="34" charset="0"/>
+                    <a:cs typeface="Arial" panose="020B0604020202020204" pitchFamily="34" charset="0"/>
+                  </a:endParaRPr>
+                </a:p>
+              </p:txBody>
+            </p:sp>
+          </mc:Choice>
+          <mc:Fallback>
+            <p:sp>
+              <p:nvSpPr>
+                <p:cNvPr id="40" name="TextBox 39"/>
+                <p:cNvSpPr txBox="1">
+                  <a:spLocks noRot="1" noChangeAspect="1" noMove="1" noResize="1" noEditPoints="1" noAdjustHandles="1" noChangeArrowheads="1" noChangeShapeType="1" noTextEdit="1"/>
+                </p:cNvSpPr>
+                <p:nvPr/>
+              </p:nvSpPr>
+              <p:spPr>
+                <a:xfrm>
+                  <a:off x="536230" y="5631848"/>
+                  <a:ext cx="310790" cy="307777"/>
+                </a:xfrm>
+                <a:prstGeom prst="rect">
+                  <a:avLst/>
+                </a:prstGeom>
+                <a:blipFill>
+                  <a:blip r:embed="rId51"/>
+                  <a:stretch>
+                    <a:fillRect l="-7843" r="-7843" b="-22000"/>
+                  </a:stretch>
+                </a:blipFill>
+              </p:spPr>
+              <p:txBody>
+                <a:bodyPr/>
+                <a:lstStyle/>
+                <a:p>
+                  <a:r>
+                    <a:rPr lang="en-US">
+                      <a:noFill/>
+                    </a:rPr>
+                    <a:t> </a:t>
+                  </a:r>
+                </a:p>
+              </p:txBody>
+            </p:sp>
+          </mc:Fallback>
+        </mc:AlternateContent>
+        <mc:AlternateContent xmlns:mc="http://schemas.openxmlformats.org/markup-compatibility/2006">
+          <mc:Choice xmlns:a14="http://schemas.microsoft.com/office/drawing/2010/main" Requires="a14">
+            <p:sp>
+              <p:nvSpPr>
+                <p:cNvPr id="66" name="TextBox 65"/>
+                <p:cNvSpPr txBox="1"/>
+                <p:nvPr/>
+              </p:nvSpPr>
+              <p:spPr>
+                <a:xfrm>
+                  <a:off x="544180" y="3939323"/>
+                  <a:ext cx="329962" cy="307777"/>
+                </a:xfrm>
+                <a:prstGeom prst="rect">
+                  <a:avLst/>
+                </a:prstGeom>
+                <a:noFill/>
+              </p:spPr>
+              <p:txBody>
+                <a:bodyPr wrap="none" lIns="0" tIns="0" rIns="0" bIns="0" rtlCol="0">
+                  <a:spAutoFit/>
+                </a:bodyPr>
+                <a:lstStyle/>
+                <a:p>
+                  <a14:m>
+                    <m:oMathPara xmlns:m="http://schemas.openxmlformats.org/officeDocument/2006/math">
+                      <m:oMathParaPr>
+                        <m:jc m:val="centerGroup"/>
+                      </m:oMathParaPr>
+                      <m:oMath xmlns:m="http://schemas.openxmlformats.org/officeDocument/2006/math">
+                        <m:sSub>
+                          <m:sSubPr>
+                            <m:ctrlPr>
+                              <a:rPr lang="en-US" sz="2000" b="0" i="1" smtClean="0">
+                                <a:latin typeface="Cambria Math" panose="02040503050406030204" pitchFamily="18" charset="0"/>
+                                <a:cs typeface="Arial" panose="020B0604020202020204" pitchFamily="34" charset="0"/>
+                              </a:rPr>
+                            </m:ctrlPr>
+                          </m:sSubPr>
+                          <m:e>
+                            <m:r>
+                              <a:rPr lang="en-US" sz="2000" b="0" i="1" smtClean="0">
+                                <a:latin typeface="Cambria Math" panose="02040503050406030204" pitchFamily="18" charset="0"/>
+                                <a:cs typeface="Arial" panose="020B0604020202020204" pitchFamily="34" charset="0"/>
+                              </a:rPr>
+                              <m:t>𝑧</m:t>
+                            </m:r>
+                          </m:e>
+                          <m:sub>
+                            <m:r>
+                              <a:rPr lang="en-US" sz="2000" b="0" i="1" smtClean="0">
+                                <a:latin typeface="Cambria Math" panose="02040503050406030204" pitchFamily="18" charset="0"/>
+                                <a:cs typeface="Arial" panose="020B0604020202020204" pitchFamily="34" charset="0"/>
+                              </a:rPr>
+                              <m:t>𝐵</m:t>
+                            </m:r>
+                          </m:sub>
+                        </m:sSub>
+                      </m:oMath>
+                    </m:oMathPara>
+                  </a14:m>
+                  <a:endParaRPr lang="en-US" sz="2000" b="0" dirty="0" smtClean="0">
+                    <a:latin typeface="Arial" panose="020B0604020202020204" pitchFamily="34" charset="0"/>
+                    <a:cs typeface="Arial" panose="020B0604020202020204" pitchFamily="34" charset="0"/>
+                  </a:endParaRPr>
+                </a:p>
+              </p:txBody>
+            </p:sp>
+          </mc:Choice>
+          <mc:Fallback>
+            <p:sp>
+              <p:nvSpPr>
+                <p:cNvPr id="66" name="TextBox 65"/>
+                <p:cNvSpPr txBox="1">
+                  <a:spLocks noRot="1" noChangeAspect="1" noMove="1" noResize="1" noEditPoints="1" noAdjustHandles="1" noChangeArrowheads="1" noChangeShapeType="1" noTextEdit="1"/>
+                </p:cNvSpPr>
+                <p:nvPr/>
+              </p:nvSpPr>
+              <p:spPr>
+                <a:xfrm>
+                  <a:off x="544180" y="3939323"/>
+                  <a:ext cx="329962" cy="307777"/>
+                </a:xfrm>
+                <a:prstGeom prst="rect">
+                  <a:avLst/>
+                </a:prstGeom>
+                <a:blipFill>
+                  <a:blip r:embed="rId52"/>
+                  <a:stretch>
+                    <a:fillRect l="-7273" r="-3636" b="-19608"/>
+                  </a:stretch>
+                </a:blipFill>
+              </p:spPr>
+              <p:txBody>
+                <a:bodyPr/>
+                <a:lstStyle/>
+                <a:p>
+                  <a:r>
+                    <a:rPr lang="en-US">
+                      <a:noFill/>
+                    </a:rPr>
+                    <a:t> </a:t>
+                  </a:r>
+                </a:p>
+              </p:txBody>
+            </p:sp>
+          </mc:Fallback>
+        </mc:AlternateContent>
+        <p:cxnSp>
+          <p:nvCxnSpPr>
+            <p:cNvPr id="67" name="Straight Arrow Connector 66"/>
+            <p:cNvCxnSpPr/>
+            <p:nvPr/>
+          </p:nvCxnSpPr>
+          <p:spPr>
+            <a:xfrm>
+              <a:off x="1338401" y="5845295"/>
+              <a:ext cx="0" cy="702527"/>
+            </a:xfrm>
+            <a:prstGeom prst="straightConnector1">
+              <a:avLst/>
+            </a:prstGeom>
+            <a:ln w="38100">
+              <a:solidFill>
+                <a:schemeClr val="tx1"/>
+              </a:solidFill>
+              <a:tailEnd type="triangle"/>
+            </a:ln>
+          </p:spPr>
+          <p:style>
+            <a:lnRef idx="1">
+              <a:schemeClr val="accent1"/>
+            </a:lnRef>
+            <a:fillRef idx="0">
+              <a:schemeClr val="accent1"/>
+            </a:fillRef>
+            <a:effectRef idx="0">
+              <a:schemeClr val="accent1"/>
+            </a:effectRef>
+            <a:fontRef idx="minor">
+              <a:schemeClr val="tx1"/>
+            </a:fontRef>
+          </p:style>
+        </p:cxnSp>
+        <mc:AlternateContent xmlns:mc="http://schemas.openxmlformats.org/markup-compatibility/2006">
+          <mc:Choice xmlns:a14="http://schemas.microsoft.com/office/drawing/2010/main" Requires="a14">
+            <p:sp>
+              <p:nvSpPr>
+                <p:cNvPr id="68" name="TextBox 67"/>
+                <p:cNvSpPr txBox="1"/>
+                <p:nvPr/>
+              </p:nvSpPr>
+              <p:spPr>
+                <a:xfrm>
+                  <a:off x="1338401" y="6093441"/>
+                  <a:ext cx="303865" cy="377219"/>
+                </a:xfrm>
+                <a:prstGeom prst="rect">
+                  <a:avLst/>
+                </a:prstGeom>
+                <a:noFill/>
+              </p:spPr>
+              <p:txBody>
+                <a:bodyPr wrap="none" lIns="0" tIns="0" rIns="0" bIns="0" rtlCol="0">
+                  <a:spAutoFit/>
+                </a:bodyPr>
+                <a:lstStyle/>
+                <a:p>
+                  <a:pPr/>
+                  <a14:m>
+                    <m:oMathPara xmlns:m="http://schemas.openxmlformats.org/officeDocument/2006/math">
+                      <m:oMathParaPr>
+                        <m:jc m:val="centerGroup"/>
+                      </m:oMathParaPr>
+                      <m:oMath xmlns:m="http://schemas.openxmlformats.org/officeDocument/2006/math">
+                        <m:sSub>
+                          <m:sSubPr>
+                            <m:ctrlPr>
+                              <a:rPr lang="en-US" sz="2000" b="0" i="1" smtClean="0">
+                                <a:latin typeface="Cambria Math" panose="02040503050406030204" pitchFamily="18" charset="0"/>
+                                <a:cs typeface="Arial" panose="020B0604020202020204" pitchFamily="34" charset="0"/>
+                              </a:rPr>
+                            </m:ctrlPr>
+                          </m:sSubPr>
+                          <m:e>
+                            <m:acc>
+                              <m:accPr>
+                                <m:chr m:val="⃗"/>
+                                <m:ctrlPr>
+                                  <a:rPr lang="en-US" sz="2000" b="0" i="1" smtClean="0">
+                                    <a:latin typeface="Cambria Math" panose="02040503050406030204" pitchFamily="18" charset="0"/>
+                                    <a:cs typeface="Arial" panose="020B0604020202020204" pitchFamily="34" charset="0"/>
+                                  </a:rPr>
+                                </m:ctrlPr>
+                              </m:accPr>
+                              <m:e>
+                                <m:r>
+                                  <a:rPr lang="en-US" sz="2000" b="0" i="1" smtClean="0">
+                                    <a:latin typeface="Cambria Math" panose="02040503050406030204" pitchFamily="18" charset="0"/>
+                                    <a:cs typeface="Arial" panose="020B0604020202020204" pitchFamily="34" charset="0"/>
+                                  </a:rPr>
+                                  <m:t>𝐹</m:t>
+                                </m:r>
+                              </m:e>
+                            </m:acc>
+                          </m:e>
+                          <m:sub>
+                            <m:r>
+                              <a:rPr lang="en-US" sz="2000" b="0" i="1" smtClean="0">
+                                <a:latin typeface="Cambria Math" panose="02040503050406030204" pitchFamily="18" charset="0"/>
+                                <a:cs typeface="Arial" panose="020B0604020202020204" pitchFamily="34" charset="0"/>
+                              </a:rPr>
+                              <m:t>𝑔</m:t>
+                            </m:r>
+                          </m:sub>
+                        </m:sSub>
+                      </m:oMath>
+                    </m:oMathPara>
+                  </a14:m>
+                  <a:endParaRPr lang="en-US" sz="2000" dirty="0" smtClean="0">
+                    <a:latin typeface="Arial" panose="020B0604020202020204" pitchFamily="34" charset="0"/>
+                    <a:cs typeface="Arial" panose="020B0604020202020204" pitchFamily="34" charset="0"/>
+                  </a:endParaRPr>
+                </a:p>
+              </p:txBody>
+            </p:sp>
+          </mc:Choice>
+          <mc:Fallback>
+            <p:sp>
+              <p:nvSpPr>
+                <p:cNvPr id="68" name="TextBox 67"/>
+                <p:cNvSpPr txBox="1">
+                  <a:spLocks noRot="1" noChangeAspect="1" noMove="1" noResize="1" noEditPoints="1" noAdjustHandles="1" noChangeArrowheads="1" noChangeShapeType="1" noTextEdit="1"/>
+                </p:cNvSpPr>
+                <p:nvPr/>
+              </p:nvSpPr>
+              <p:spPr>
+                <a:xfrm>
+                  <a:off x="1338401" y="6093441"/>
+                  <a:ext cx="303865" cy="377219"/>
+                </a:xfrm>
+                <a:prstGeom prst="rect">
+                  <a:avLst/>
+                </a:prstGeom>
+                <a:blipFill>
+                  <a:blip r:embed="rId53"/>
+                  <a:stretch>
+                    <a:fillRect l="-18000" t="-32258" r="-70000" b="-17742"/>
+                  </a:stretch>
+                </a:blipFill>
+              </p:spPr>
+              <p:txBody>
+                <a:bodyPr/>
+                <a:lstStyle/>
+                <a:p>
+                  <a:r>
+                    <a:rPr lang="en-US">
+                      <a:noFill/>
+                    </a:rPr>
+                    <a:t> </a:t>
+                  </a:r>
+                </a:p>
+              </p:txBody>
+            </p:sp>
+          </mc:Fallback>
+        </mc:AlternateContent>
+        <mc:AlternateContent xmlns:mc="http://schemas.openxmlformats.org/markup-compatibility/2006">
+          <mc:Choice xmlns:a14="http://schemas.microsoft.com/office/drawing/2010/main" Requires="a14">
+            <p:sp>
+              <p:nvSpPr>
+                <p:cNvPr id="71" name="TextBox 70"/>
+                <p:cNvSpPr txBox="1"/>
+                <p:nvPr/>
+              </p:nvSpPr>
+              <p:spPr>
+                <a:xfrm>
+                  <a:off x="1570152" y="5039704"/>
+                  <a:ext cx="1108893" cy="354649"/>
+                </a:xfrm>
+                <a:prstGeom prst="rect">
+                  <a:avLst/>
+                </a:prstGeom>
+                <a:noFill/>
+              </p:spPr>
+              <p:txBody>
+                <a:bodyPr wrap="none" lIns="0" tIns="0" rIns="0" bIns="0" rtlCol="0">
+                  <a:spAutoFit/>
+                </a:bodyPr>
+                <a:lstStyle/>
+                <a:p>
+                  <a:pPr/>
+                  <a14:m>
+                    <m:oMathPara xmlns:m="http://schemas.openxmlformats.org/officeDocument/2006/math">
+                      <m:oMathParaPr>
+                        <m:jc m:val="centerGroup"/>
+                      </m:oMathParaPr>
+                      <m:oMath xmlns:m="http://schemas.openxmlformats.org/officeDocument/2006/math">
+                        <m:r>
+                          <a:rPr lang="en-US" sz="2000" b="0" i="1" smtClean="0">
+                            <a:solidFill>
+                              <a:srgbClr val="FF0000"/>
+                            </a:solidFill>
+                            <a:latin typeface="Cambria Math" panose="02040503050406030204" pitchFamily="18" charset="0"/>
+                            <a:cs typeface="Arial" panose="020B0604020202020204" pitchFamily="34" charset="0"/>
+                          </a:rPr>
+                          <m:t>𝑑</m:t>
+                        </m:r>
+                        <m:acc>
+                          <m:accPr>
+                            <m:chr m:val="⃗"/>
+                            <m:ctrlPr>
+                              <a:rPr lang="en-US" sz="2000" b="0" i="1" smtClean="0">
+                                <a:solidFill>
+                                  <a:srgbClr val="FF0000"/>
+                                </a:solidFill>
+                                <a:latin typeface="Cambria Math" panose="02040503050406030204" pitchFamily="18" charset="0"/>
+                                <a:cs typeface="Arial" panose="020B0604020202020204" pitchFamily="34" charset="0"/>
+                              </a:rPr>
+                            </m:ctrlPr>
+                          </m:accPr>
+                          <m:e>
+                            <m:r>
+                              <a:rPr lang="en-US" sz="2000" b="0" i="1" smtClean="0">
+                                <a:solidFill>
+                                  <a:srgbClr val="FF0000"/>
+                                </a:solidFill>
+                                <a:latin typeface="Cambria Math" panose="02040503050406030204" pitchFamily="18" charset="0"/>
+                                <a:cs typeface="Arial" panose="020B0604020202020204" pitchFamily="34" charset="0"/>
+                              </a:rPr>
+                              <m:t>𝑙</m:t>
+                            </m:r>
+                          </m:e>
+                        </m:acc>
+                        <m:r>
+                          <a:rPr lang="en-US" sz="2000" b="0" i="1" smtClean="0">
+                            <a:solidFill>
+                              <a:srgbClr val="FF0000"/>
+                            </a:solidFill>
+                            <a:latin typeface="Cambria Math" panose="02040503050406030204" pitchFamily="18" charset="0"/>
+                            <a:cs typeface="Arial" panose="020B0604020202020204" pitchFamily="34" charset="0"/>
+                          </a:rPr>
+                          <m:t>=</m:t>
+                        </m:r>
+                        <m:r>
+                          <a:rPr lang="en-US" sz="2000" b="0" i="1" smtClean="0">
+                            <a:solidFill>
+                              <a:srgbClr val="FF0000"/>
+                            </a:solidFill>
+                            <a:latin typeface="Cambria Math" panose="02040503050406030204" pitchFamily="18" charset="0"/>
+                            <a:cs typeface="Arial" panose="020B0604020202020204" pitchFamily="34" charset="0"/>
+                          </a:rPr>
+                          <m:t>𝑑𝑧</m:t>
+                        </m:r>
+                        <m:r>
+                          <a:rPr lang="en-US" sz="2000" b="0" i="1" smtClean="0">
+                            <a:solidFill>
+                              <a:srgbClr val="FF0000"/>
+                            </a:solidFill>
+                            <a:latin typeface="Cambria Math" panose="02040503050406030204" pitchFamily="18" charset="0"/>
+                            <a:cs typeface="Arial" panose="020B0604020202020204" pitchFamily="34" charset="0"/>
+                          </a:rPr>
+                          <m:t> </m:t>
+                        </m:r>
+                        <m:acc>
+                          <m:accPr>
+                            <m:chr m:val="̂"/>
+                            <m:ctrlPr>
+                              <a:rPr lang="en-US" sz="2000" b="0" i="1" smtClean="0">
+                                <a:solidFill>
+                                  <a:srgbClr val="FF0000"/>
+                                </a:solidFill>
+                                <a:latin typeface="Cambria Math" panose="02040503050406030204" pitchFamily="18" charset="0"/>
+                                <a:cs typeface="Arial" panose="020B0604020202020204" pitchFamily="34" charset="0"/>
+                              </a:rPr>
+                            </m:ctrlPr>
+                          </m:accPr>
+                          <m:e>
+                            <m:r>
+                              <a:rPr lang="en-US" sz="2000" b="0" i="1" smtClean="0">
+                                <a:solidFill>
+                                  <a:srgbClr val="FF0000"/>
+                                </a:solidFill>
+                                <a:latin typeface="Cambria Math" panose="02040503050406030204" pitchFamily="18" charset="0"/>
+                                <a:cs typeface="Arial" panose="020B0604020202020204" pitchFamily="34" charset="0"/>
+                              </a:rPr>
+                              <m:t>𝑧</m:t>
+                            </m:r>
+                          </m:e>
+                        </m:acc>
+                      </m:oMath>
+                    </m:oMathPara>
+                  </a14:m>
+                  <a:endParaRPr lang="en-US" sz="2000" dirty="0" smtClean="0">
+                    <a:solidFill>
+                      <a:srgbClr val="FF0000"/>
+                    </a:solidFill>
+                    <a:latin typeface="Arial" panose="020B0604020202020204" pitchFamily="34" charset="0"/>
+                    <a:cs typeface="Arial" panose="020B0604020202020204" pitchFamily="34" charset="0"/>
+                  </a:endParaRPr>
+                </a:p>
+              </p:txBody>
+            </p:sp>
+          </mc:Choice>
+          <mc:Fallback>
+            <p:sp>
+              <p:nvSpPr>
+                <p:cNvPr id="71" name="TextBox 70"/>
+                <p:cNvSpPr txBox="1">
+                  <a:spLocks noRot="1" noChangeAspect="1" noMove="1" noResize="1" noEditPoints="1" noAdjustHandles="1" noChangeArrowheads="1" noChangeShapeType="1" noTextEdit="1"/>
+                </p:cNvSpPr>
+                <p:nvPr/>
+              </p:nvSpPr>
+              <p:spPr>
+                <a:xfrm>
+                  <a:off x="1570152" y="5039704"/>
+                  <a:ext cx="1108893" cy="354649"/>
+                </a:xfrm>
+                <a:prstGeom prst="rect">
+                  <a:avLst/>
+                </a:prstGeom>
+                <a:blipFill>
+                  <a:blip r:embed="rId54"/>
+                  <a:stretch>
+                    <a:fillRect l="-4396" t="-34483" r="-30220" b="-41379"/>
+                  </a:stretch>
+                </a:blipFill>
+              </p:spPr>
+              <p:txBody>
+                <a:bodyPr/>
+                <a:lstStyle/>
+                <a:p>
+                  <a:r>
+                    <a:rPr lang="en-US">
+                      <a:noFill/>
+                    </a:rPr>
+                    <a:t> </a:t>
+                  </a:r>
+                </a:p>
+              </p:txBody>
+            </p:sp>
+          </mc:Fallback>
+        </mc:AlternateContent>
+        <p:cxnSp>
+          <p:nvCxnSpPr>
+            <p:cNvPr id="72" name="Straight Arrow Connector 71"/>
+            <p:cNvCxnSpPr/>
+            <p:nvPr/>
+          </p:nvCxnSpPr>
+          <p:spPr>
+            <a:xfrm flipV="1">
+              <a:off x="1321492" y="5100128"/>
+              <a:ext cx="0" cy="316252"/>
+            </a:xfrm>
+            <a:prstGeom prst="straightConnector1">
+              <a:avLst/>
+            </a:prstGeom>
+            <a:ln w="57150">
+              <a:solidFill>
+                <a:srgbClr val="FF0000"/>
+              </a:solidFill>
+              <a:tailEnd type="triangle"/>
+            </a:ln>
+          </p:spPr>
+          <p:style>
+            <a:lnRef idx="1">
+              <a:schemeClr val="accent1"/>
+            </a:lnRef>
+            <a:fillRef idx="0">
+              <a:schemeClr val="accent1"/>
+            </a:fillRef>
+            <a:effectRef idx="0">
+              <a:schemeClr val="accent1"/>
+            </a:effectRef>
+            <a:fontRef idx="minor">
+              <a:schemeClr val="tx1"/>
+            </a:fontRef>
+          </p:style>
+        </p:cxnSp>
       </p:grpSp>
     </p:spTree>
     <p:extLst>

</xml_diff>

<commit_message>
started cons of energy
</commit_message>
<xml_diff>
--- a/tex/figures/PotentialECons/Figures.pptx
+++ b/tex/figures/PotentialECons/Figures.pptx
@@ -7,6 +7,7 @@
   <p:sldIdLst>
     <p:sldId id="271" r:id="rId2"/>
     <p:sldId id="272" r:id="rId3"/>
+    <p:sldId id="273" r:id="rId4"/>
   </p:sldIdLst>
   <p:sldSz cx="12192000" cy="6858000"/>
   <p:notesSz cx="6858000" cy="9144000"/>
@@ -244,7 +245,7 @@
           <a:p>
             <a:fld id="{F7249F8D-641B-4CAF-BAE5-10524742F6F1}" type="datetimeFigureOut">
               <a:rPr lang="en-CA" smtClean="0"/>
-              <a:t>2018-06-08</a:t>
+              <a:t>2018-06-10</a:t>
             </a:fld>
             <a:endParaRPr lang="en-CA"/>
           </a:p>
@@ -414,7 +415,7 @@
           <a:p>
             <a:fld id="{F7249F8D-641B-4CAF-BAE5-10524742F6F1}" type="datetimeFigureOut">
               <a:rPr lang="en-CA" smtClean="0"/>
-              <a:t>2018-06-08</a:t>
+              <a:t>2018-06-10</a:t>
             </a:fld>
             <a:endParaRPr lang="en-CA"/>
           </a:p>
@@ -594,7 +595,7 @@
           <a:p>
             <a:fld id="{F7249F8D-641B-4CAF-BAE5-10524742F6F1}" type="datetimeFigureOut">
               <a:rPr lang="en-CA" smtClean="0"/>
-              <a:t>2018-06-08</a:t>
+              <a:t>2018-06-10</a:t>
             </a:fld>
             <a:endParaRPr lang="en-CA"/>
           </a:p>
@@ -764,7 +765,7 @@
           <a:p>
             <a:fld id="{F7249F8D-641B-4CAF-BAE5-10524742F6F1}" type="datetimeFigureOut">
               <a:rPr lang="en-CA" smtClean="0"/>
-              <a:t>2018-06-08</a:t>
+              <a:t>2018-06-10</a:t>
             </a:fld>
             <a:endParaRPr lang="en-CA"/>
           </a:p>
@@ -1010,7 +1011,7 @@
           <a:p>
             <a:fld id="{F7249F8D-641B-4CAF-BAE5-10524742F6F1}" type="datetimeFigureOut">
               <a:rPr lang="en-CA" smtClean="0"/>
-              <a:t>2018-06-08</a:t>
+              <a:t>2018-06-10</a:t>
             </a:fld>
             <a:endParaRPr lang="en-CA"/>
           </a:p>
@@ -1242,7 +1243,7 @@
           <a:p>
             <a:fld id="{F7249F8D-641B-4CAF-BAE5-10524742F6F1}" type="datetimeFigureOut">
               <a:rPr lang="en-CA" smtClean="0"/>
-              <a:t>2018-06-08</a:t>
+              <a:t>2018-06-10</a:t>
             </a:fld>
             <a:endParaRPr lang="en-CA"/>
           </a:p>
@@ -1609,7 +1610,7 @@
           <a:p>
             <a:fld id="{F7249F8D-641B-4CAF-BAE5-10524742F6F1}" type="datetimeFigureOut">
               <a:rPr lang="en-CA" smtClean="0"/>
-              <a:t>2018-06-08</a:t>
+              <a:t>2018-06-10</a:t>
             </a:fld>
             <a:endParaRPr lang="en-CA"/>
           </a:p>
@@ -1727,7 +1728,7 @@
           <a:p>
             <a:fld id="{F7249F8D-641B-4CAF-BAE5-10524742F6F1}" type="datetimeFigureOut">
               <a:rPr lang="en-CA" smtClean="0"/>
-              <a:t>2018-06-08</a:t>
+              <a:t>2018-06-10</a:t>
             </a:fld>
             <a:endParaRPr lang="en-CA"/>
           </a:p>
@@ -1822,7 +1823,7 @@
           <a:p>
             <a:fld id="{F7249F8D-641B-4CAF-BAE5-10524742F6F1}" type="datetimeFigureOut">
               <a:rPr lang="en-CA" smtClean="0"/>
-              <a:t>2018-06-08</a:t>
+              <a:t>2018-06-10</a:t>
             </a:fld>
             <a:endParaRPr lang="en-CA"/>
           </a:p>
@@ -2099,7 +2100,7 @@
           <a:p>
             <a:fld id="{F7249F8D-641B-4CAF-BAE5-10524742F6F1}" type="datetimeFigureOut">
               <a:rPr lang="en-CA" smtClean="0"/>
-              <a:t>2018-06-08</a:t>
+              <a:t>2018-06-10</a:t>
             </a:fld>
             <a:endParaRPr lang="en-CA"/>
           </a:p>
@@ -2352,7 +2353,7 @@
           <a:p>
             <a:fld id="{F7249F8D-641B-4CAF-BAE5-10524742F6F1}" type="datetimeFigureOut">
               <a:rPr lang="en-CA" smtClean="0"/>
-              <a:t>2018-06-08</a:t>
+              <a:t>2018-06-10</a:t>
             </a:fld>
             <a:endParaRPr lang="en-CA"/>
           </a:p>
@@ -2565,7 +2566,7 @@
           <a:p>
             <a:fld id="{F7249F8D-641B-4CAF-BAE5-10524742F6F1}" type="datetimeFigureOut">
               <a:rPr lang="en-CA" smtClean="0"/>
-              <a:t>2018-06-08</a:t>
+              <a:t>2018-06-10</a:t>
             </a:fld>
             <a:endParaRPr lang="en-CA"/>
           </a:p>
@@ -9212,8 +9213,8 @@
             </a:fontRef>
           </p:style>
         </p:cxnSp>
-        <mc:AlternateContent xmlns:mc="http://schemas.openxmlformats.org/markup-compatibility/2006">
-          <mc:Choice xmlns:a14="http://schemas.microsoft.com/office/drawing/2010/main" Requires="a14">
+        <mc:AlternateContent xmlns:mc="http://schemas.openxmlformats.org/markup-compatibility/2006" xmlns:a14="http://schemas.microsoft.com/office/drawing/2010/main">
+          <mc:Choice Requires="a14">
             <p:sp>
               <p:nvSpPr>
                 <p:cNvPr id="85" name="TextBox 45"/>
@@ -9355,7 +9356,7 @@
               </p:txBody>
             </p:sp>
           </mc:Choice>
-          <mc:Fallback>
+          <mc:Fallback xmlns="">
             <p:sp>
               <p:nvSpPr>
                 <p:cNvPr id="85" name="TextBox 45"/>
@@ -9394,8 +9395,8 @@
             </p:sp>
           </mc:Fallback>
         </mc:AlternateContent>
-        <mc:AlternateContent xmlns:mc="http://schemas.openxmlformats.org/markup-compatibility/2006">
-          <mc:Choice xmlns:a14="http://schemas.microsoft.com/office/drawing/2010/main" Requires="a14">
+        <mc:AlternateContent xmlns:mc="http://schemas.openxmlformats.org/markup-compatibility/2006" xmlns:a14="http://schemas.microsoft.com/office/drawing/2010/main">
+          <mc:Choice Requires="a14">
             <p:sp>
               <p:nvSpPr>
                 <p:cNvPr id="86" name="TextBox 46"/>
@@ -9537,7 +9538,7 @@
               </p:txBody>
             </p:sp>
           </mc:Choice>
-          <mc:Fallback>
+          <mc:Fallback xmlns="">
             <p:sp>
               <p:nvSpPr>
                 <p:cNvPr id="86" name="TextBox 46"/>
@@ -9676,8 +9677,8 @@
                 </a:fontRef>
               </p:style>
             </p:cxnSp>
-            <mc:AlternateContent xmlns:mc="http://schemas.openxmlformats.org/markup-compatibility/2006">
-              <mc:Choice xmlns:a14="http://schemas.microsoft.com/office/drawing/2010/main" Requires="a14">
+            <mc:AlternateContent xmlns:mc="http://schemas.openxmlformats.org/markup-compatibility/2006" xmlns:a14="http://schemas.microsoft.com/office/drawing/2010/main">
+              <mc:Choice Requires="a14">
                 <p:sp>
                   <p:nvSpPr>
                     <p:cNvPr id="92" name="Rectangle 91"/>
@@ -9815,7 +9816,7 @@
                   </p:txBody>
                 </p:sp>
               </mc:Choice>
-              <mc:Fallback>
+              <mc:Fallback xmlns="">
                 <p:sp>
                   <p:nvSpPr>
                     <p:cNvPr id="92" name="Rectangle 91"/>
@@ -9854,8 +9855,8 @@
                 </p:sp>
               </mc:Fallback>
             </mc:AlternateContent>
-            <mc:AlternateContent xmlns:mc="http://schemas.openxmlformats.org/markup-compatibility/2006">
-              <mc:Choice xmlns:a14="http://schemas.microsoft.com/office/drawing/2010/main" Requires="a14">
+            <mc:AlternateContent xmlns:mc="http://schemas.openxmlformats.org/markup-compatibility/2006" xmlns:a14="http://schemas.microsoft.com/office/drawing/2010/main">
+              <mc:Choice Requires="a14">
                 <p:sp>
                   <p:nvSpPr>
                     <p:cNvPr id="93" name="Rectangle 92"/>
@@ -9992,7 +9993,7 @@
                   </p:txBody>
                 </p:sp>
               </mc:Choice>
-              <mc:Fallback>
+              <mc:Fallback xmlns="">
                 <p:sp>
                   <p:nvSpPr>
                     <p:cNvPr id="93" name="Rectangle 92"/>
@@ -10031,8 +10032,8 @@
                 </p:sp>
               </mc:Fallback>
             </mc:AlternateContent>
-            <mc:AlternateContent xmlns:mc="http://schemas.openxmlformats.org/markup-compatibility/2006">
-              <mc:Choice xmlns:a14="http://schemas.microsoft.com/office/drawing/2010/main" Requires="a14">
+            <mc:AlternateContent xmlns:mc="http://schemas.openxmlformats.org/markup-compatibility/2006" xmlns:a14="http://schemas.microsoft.com/office/drawing/2010/main">
+              <mc:Choice Requires="a14">
                 <p:sp>
                   <p:nvSpPr>
                     <p:cNvPr id="94" name="Rectangle 93"/>
@@ -10170,7 +10171,7 @@
                   </p:txBody>
                 </p:sp>
               </mc:Choice>
-              <mc:Fallback>
+              <mc:Fallback xmlns="">
                 <p:sp>
                   <p:nvSpPr>
                     <p:cNvPr id="94" name="Rectangle 93"/>
@@ -10335,6 +10336,1705 @@
     <p:extLst>
       <p:ext uri="{BB962C8B-B14F-4D97-AF65-F5344CB8AC3E}">
         <p14:creationId xmlns:p14="http://schemas.microsoft.com/office/powerpoint/2010/main" val="427799228"/>
+      </p:ext>
+    </p:extLst>
+  </p:cSld>
+  <p:clrMapOvr>
+    <a:masterClrMapping/>
+  </p:clrMapOvr>
+</p:sld>
+</file>
+
+<file path=ppt/slides/slide3.xml><?xml version="1.0" encoding="utf-8"?>
+<p:sld xmlns:a="http://schemas.openxmlformats.org/drawingml/2006/main" xmlns:r="http://schemas.openxmlformats.org/officeDocument/2006/relationships" xmlns:p="http://schemas.openxmlformats.org/presentationml/2006/main">
+  <p:cSld>
+    <p:spTree>
+      <p:nvGrpSpPr>
+        <p:cNvPr id="1" name=""/>
+        <p:cNvGrpSpPr/>
+        <p:nvPr/>
+      </p:nvGrpSpPr>
+      <p:grpSpPr>
+        <a:xfrm>
+          <a:off x="0" y="0"/>
+          <a:ext cx="0" cy="0"/>
+          <a:chOff x="0" y="0"/>
+          <a:chExt cx="0" cy="0"/>
+        </a:xfrm>
+      </p:grpSpPr>
+      <p:grpSp>
+        <p:nvGrpSpPr>
+          <p:cNvPr id="4" name="Group 3"/>
+          <p:cNvGrpSpPr/>
+          <p:nvPr/>
+        </p:nvGrpSpPr>
+        <p:grpSpPr>
+          <a:xfrm>
+            <a:off x="718242" y="1143612"/>
+            <a:ext cx="4820330" cy="1496599"/>
+            <a:chOff x="750898" y="3142870"/>
+            <a:chExt cx="4820330" cy="1496599"/>
+          </a:xfrm>
+        </p:grpSpPr>
+        <p:grpSp>
+          <p:nvGrpSpPr>
+            <p:cNvPr id="5" name="Group 4"/>
+            <p:cNvGrpSpPr/>
+            <p:nvPr/>
+          </p:nvGrpSpPr>
+          <p:grpSpPr>
+            <a:xfrm>
+              <a:off x="750898" y="3142870"/>
+              <a:ext cx="4820330" cy="1496599"/>
+              <a:chOff x="983570" y="3488958"/>
+              <a:chExt cx="4820330" cy="1496599"/>
+            </a:xfrm>
+          </p:grpSpPr>
+          <p:sp>
+            <p:nvSpPr>
+              <p:cNvPr id="10" name="Rectangle 9"/>
+              <p:cNvSpPr/>
+              <p:nvPr/>
+            </p:nvSpPr>
+            <p:spPr>
+              <a:xfrm rot="1669539">
+                <a:off x="1721773" y="3488958"/>
+                <a:ext cx="569343" cy="629728"/>
+              </a:xfrm>
+              <a:prstGeom prst="rect">
+                <a:avLst/>
+              </a:prstGeom>
+              <a:solidFill>
+                <a:schemeClr val="bg2">
+                  <a:lumMod val="90000"/>
+                </a:schemeClr>
+              </a:solidFill>
+              <a:ln w="38100">
+                <a:solidFill>
+                  <a:schemeClr val="tx1"/>
+                </a:solidFill>
+              </a:ln>
+            </p:spPr>
+            <p:style>
+              <a:lnRef idx="2">
+                <a:schemeClr val="accent1">
+                  <a:shade val="50000"/>
+                </a:schemeClr>
+              </a:lnRef>
+              <a:fillRef idx="1">
+                <a:schemeClr val="accent1"/>
+              </a:fillRef>
+              <a:effectRef idx="0">
+                <a:schemeClr val="accent1"/>
+              </a:effectRef>
+              <a:fontRef idx="minor">
+                <a:schemeClr val="lt1"/>
+              </a:fontRef>
+            </p:style>
+            <p:txBody>
+              <a:bodyPr rtlCol="0" anchor="ctr"/>
+              <a:lstStyle>
+                <a:defPPr>
+                  <a:defRPr lang="en-US"/>
+                </a:defPPr>
+                <a:lvl1pPr marL="0" algn="l" defTabSz="914400" rtl="0" eaLnBrk="1" latinLnBrk="0" hangingPunct="1">
+                  <a:defRPr sz="1800" kern="1200">
+                    <a:solidFill>
+                      <a:schemeClr val="lt1"/>
+                    </a:solidFill>
+                    <a:latin typeface="+mn-lt"/>
+                    <a:ea typeface="+mn-ea"/>
+                    <a:cs typeface="+mn-cs"/>
+                  </a:defRPr>
+                </a:lvl1pPr>
+                <a:lvl2pPr marL="457200" algn="l" defTabSz="914400" rtl="0" eaLnBrk="1" latinLnBrk="0" hangingPunct="1">
+                  <a:defRPr sz="1800" kern="1200">
+                    <a:solidFill>
+                      <a:schemeClr val="lt1"/>
+                    </a:solidFill>
+                    <a:latin typeface="+mn-lt"/>
+                    <a:ea typeface="+mn-ea"/>
+                    <a:cs typeface="+mn-cs"/>
+                  </a:defRPr>
+                </a:lvl2pPr>
+                <a:lvl3pPr marL="914400" algn="l" defTabSz="914400" rtl="0" eaLnBrk="1" latinLnBrk="0" hangingPunct="1">
+                  <a:defRPr sz="1800" kern="1200">
+                    <a:solidFill>
+                      <a:schemeClr val="lt1"/>
+                    </a:solidFill>
+                    <a:latin typeface="+mn-lt"/>
+                    <a:ea typeface="+mn-ea"/>
+                    <a:cs typeface="+mn-cs"/>
+                  </a:defRPr>
+                </a:lvl3pPr>
+                <a:lvl4pPr marL="1371600" algn="l" defTabSz="914400" rtl="0" eaLnBrk="1" latinLnBrk="0" hangingPunct="1">
+                  <a:defRPr sz="1800" kern="1200">
+                    <a:solidFill>
+                      <a:schemeClr val="lt1"/>
+                    </a:solidFill>
+                    <a:latin typeface="+mn-lt"/>
+                    <a:ea typeface="+mn-ea"/>
+                    <a:cs typeface="+mn-cs"/>
+                  </a:defRPr>
+                </a:lvl4pPr>
+                <a:lvl5pPr marL="1828800" algn="l" defTabSz="914400" rtl="0" eaLnBrk="1" latinLnBrk="0" hangingPunct="1">
+                  <a:defRPr sz="1800" kern="1200">
+                    <a:solidFill>
+                      <a:schemeClr val="lt1"/>
+                    </a:solidFill>
+                    <a:latin typeface="+mn-lt"/>
+                    <a:ea typeface="+mn-ea"/>
+                    <a:cs typeface="+mn-cs"/>
+                  </a:defRPr>
+                </a:lvl5pPr>
+                <a:lvl6pPr marL="2286000" algn="l" defTabSz="914400" rtl="0" eaLnBrk="1" latinLnBrk="0" hangingPunct="1">
+                  <a:defRPr sz="1800" kern="1200">
+                    <a:solidFill>
+                      <a:schemeClr val="lt1"/>
+                    </a:solidFill>
+                    <a:latin typeface="+mn-lt"/>
+                    <a:ea typeface="+mn-ea"/>
+                    <a:cs typeface="+mn-cs"/>
+                  </a:defRPr>
+                </a:lvl6pPr>
+                <a:lvl7pPr marL="2743200" algn="l" defTabSz="914400" rtl="0" eaLnBrk="1" latinLnBrk="0" hangingPunct="1">
+                  <a:defRPr sz="1800" kern="1200">
+                    <a:solidFill>
+                      <a:schemeClr val="lt1"/>
+                    </a:solidFill>
+                    <a:latin typeface="+mn-lt"/>
+                    <a:ea typeface="+mn-ea"/>
+                    <a:cs typeface="+mn-cs"/>
+                  </a:defRPr>
+                </a:lvl7pPr>
+                <a:lvl8pPr marL="3200400" algn="l" defTabSz="914400" rtl="0" eaLnBrk="1" latinLnBrk="0" hangingPunct="1">
+                  <a:defRPr sz="1800" kern="1200">
+                    <a:solidFill>
+                      <a:schemeClr val="lt1"/>
+                    </a:solidFill>
+                    <a:latin typeface="+mn-lt"/>
+                    <a:ea typeface="+mn-ea"/>
+                    <a:cs typeface="+mn-cs"/>
+                  </a:defRPr>
+                </a:lvl8pPr>
+                <a:lvl9pPr marL="3657600" algn="l" defTabSz="914400" rtl="0" eaLnBrk="1" latinLnBrk="0" hangingPunct="1">
+                  <a:defRPr sz="1800" kern="1200">
+                    <a:solidFill>
+                      <a:schemeClr val="lt1"/>
+                    </a:solidFill>
+                    <a:latin typeface="+mn-lt"/>
+                    <a:ea typeface="+mn-ea"/>
+                    <a:cs typeface="+mn-cs"/>
+                  </a:defRPr>
+                </a:lvl9pPr>
+              </a:lstStyle>
+              <a:p>
+                <a:pPr algn="ctr"/>
+                <a:endParaRPr lang="en-US"/>
+              </a:p>
+            </p:txBody>
+          </p:sp>
+          <p:sp>
+            <p:nvSpPr>
+              <p:cNvPr id="11" name="Right Triangle 10"/>
+              <p:cNvSpPr/>
+              <p:nvPr/>
+            </p:nvSpPr>
+            <p:spPr>
+              <a:xfrm>
+                <a:off x="983570" y="3642775"/>
+                <a:ext cx="2182483" cy="1121841"/>
+              </a:xfrm>
+              <a:prstGeom prst="rtTriangle">
+                <a:avLst/>
+              </a:prstGeom>
+              <a:solidFill>
+                <a:schemeClr val="bg2">
+                  <a:lumMod val="75000"/>
+                </a:schemeClr>
+              </a:solidFill>
+              <a:ln w="38100">
+                <a:noFill/>
+              </a:ln>
+            </p:spPr>
+            <p:style>
+              <a:lnRef idx="2">
+                <a:schemeClr val="accent1">
+                  <a:shade val="50000"/>
+                </a:schemeClr>
+              </a:lnRef>
+              <a:fillRef idx="1">
+                <a:schemeClr val="accent1"/>
+              </a:fillRef>
+              <a:effectRef idx="0">
+                <a:schemeClr val="accent1"/>
+              </a:effectRef>
+              <a:fontRef idx="minor">
+                <a:schemeClr val="lt1"/>
+              </a:fontRef>
+            </p:style>
+            <p:txBody>
+              <a:bodyPr rtlCol="0" anchor="ctr"/>
+              <a:lstStyle>
+                <a:defPPr>
+                  <a:defRPr lang="en-US"/>
+                </a:defPPr>
+                <a:lvl1pPr marL="0" algn="l" defTabSz="914400" rtl="0" eaLnBrk="1" latinLnBrk="0" hangingPunct="1">
+                  <a:defRPr sz="1800" kern="1200">
+                    <a:solidFill>
+                      <a:schemeClr val="lt1"/>
+                    </a:solidFill>
+                    <a:latin typeface="+mn-lt"/>
+                    <a:ea typeface="+mn-ea"/>
+                    <a:cs typeface="+mn-cs"/>
+                  </a:defRPr>
+                </a:lvl1pPr>
+                <a:lvl2pPr marL="457200" algn="l" defTabSz="914400" rtl="0" eaLnBrk="1" latinLnBrk="0" hangingPunct="1">
+                  <a:defRPr sz="1800" kern="1200">
+                    <a:solidFill>
+                      <a:schemeClr val="lt1"/>
+                    </a:solidFill>
+                    <a:latin typeface="+mn-lt"/>
+                    <a:ea typeface="+mn-ea"/>
+                    <a:cs typeface="+mn-cs"/>
+                  </a:defRPr>
+                </a:lvl2pPr>
+                <a:lvl3pPr marL="914400" algn="l" defTabSz="914400" rtl="0" eaLnBrk="1" latinLnBrk="0" hangingPunct="1">
+                  <a:defRPr sz="1800" kern="1200">
+                    <a:solidFill>
+                      <a:schemeClr val="lt1"/>
+                    </a:solidFill>
+                    <a:latin typeface="+mn-lt"/>
+                    <a:ea typeface="+mn-ea"/>
+                    <a:cs typeface="+mn-cs"/>
+                  </a:defRPr>
+                </a:lvl3pPr>
+                <a:lvl4pPr marL="1371600" algn="l" defTabSz="914400" rtl="0" eaLnBrk="1" latinLnBrk="0" hangingPunct="1">
+                  <a:defRPr sz="1800" kern="1200">
+                    <a:solidFill>
+                      <a:schemeClr val="lt1"/>
+                    </a:solidFill>
+                    <a:latin typeface="+mn-lt"/>
+                    <a:ea typeface="+mn-ea"/>
+                    <a:cs typeface="+mn-cs"/>
+                  </a:defRPr>
+                </a:lvl4pPr>
+                <a:lvl5pPr marL="1828800" algn="l" defTabSz="914400" rtl="0" eaLnBrk="1" latinLnBrk="0" hangingPunct="1">
+                  <a:defRPr sz="1800" kern="1200">
+                    <a:solidFill>
+                      <a:schemeClr val="lt1"/>
+                    </a:solidFill>
+                    <a:latin typeface="+mn-lt"/>
+                    <a:ea typeface="+mn-ea"/>
+                    <a:cs typeface="+mn-cs"/>
+                  </a:defRPr>
+                </a:lvl5pPr>
+                <a:lvl6pPr marL="2286000" algn="l" defTabSz="914400" rtl="0" eaLnBrk="1" latinLnBrk="0" hangingPunct="1">
+                  <a:defRPr sz="1800" kern="1200">
+                    <a:solidFill>
+                      <a:schemeClr val="lt1"/>
+                    </a:solidFill>
+                    <a:latin typeface="+mn-lt"/>
+                    <a:ea typeface="+mn-ea"/>
+                    <a:cs typeface="+mn-cs"/>
+                  </a:defRPr>
+                </a:lvl6pPr>
+                <a:lvl7pPr marL="2743200" algn="l" defTabSz="914400" rtl="0" eaLnBrk="1" latinLnBrk="0" hangingPunct="1">
+                  <a:defRPr sz="1800" kern="1200">
+                    <a:solidFill>
+                      <a:schemeClr val="lt1"/>
+                    </a:solidFill>
+                    <a:latin typeface="+mn-lt"/>
+                    <a:ea typeface="+mn-ea"/>
+                    <a:cs typeface="+mn-cs"/>
+                  </a:defRPr>
+                </a:lvl7pPr>
+                <a:lvl8pPr marL="3200400" algn="l" defTabSz="914400" rtl="0" eaLnBrk="1" latinLnBrk="0" hangingPunct="1">
+                  <a:defRPr sz="1800" kern="1200">
+                    <a:solidFill>
+                      <a:schemeClr val="lt1"/>
+                    </a:solidFill>
+                    <a:latin typeface="+mn-lt"/>
+                    <a:ea typeface="+mn-ea"/>
+                    <a:cs typeface="+mn-cs"/>
+                  </a:defRPr>
+                </a:lvl8pPr>
+                <a:lvl9pPr marL="3657600" algn="l" defTabSz="914400" rtl="0" eaLnBrk="1" latinLnBrk="0" hangingPunct="1">
+                  <a:defRPr sz="1800" kern="1200">
+                    <a:solidFill>
+                      <a:schemeClr val="lt1"/>
+                    </a:solidFill>
+                    <a:latin typeface="+mn-lt"/>
+                    <a:ea typeface="+mn-ea"/>
+                    <a:cs typeface="+mn-cs"/>
+                  </a:defRPr>
+                </a:lvl9pPr>
+              </a:lstStyle>
+              <a:p>
+                <a:pPr algn="ctr"/>
+                <a:endParaRPr lang="en-US"/>
+              </a:p>
+            </p:txBody>
+          </p:sp>
+          <p:sp>
+            <p:nvSpPr>
+              <p:cNvPr id="12" name="Rectangle 11"/>
+              <p:cNvSpPr/>
+              <p:nvPr/>
+            </p:nvSpPr>
+            <p:spPr>
+              <a:xfrm>
+                <a:off x="983570" y="4764616"/>
+                <a:ext cx="4820330" cy="220941"/>
+              </a:xfrm>
+              <a:prstGeom prst="rect">
+                <a:avLst/>
+              </a:prstGeom>
+              <a:solidFill>
+                <a:schemeClr val="bg2">
+                  <a:lumMod val="75000"/>
+                </a:schemeClr>
+              </a:solidFill>
+              <a:ln w="38100">
+                <a:noFill/>
+              </a:ln>
+            </p:spPr>
+            <p:style>
+              <a:lnRef idx="2">
+                <a:schemeClr val="accent1">
+                  <a:shade val="50000"/>
+                </a:schemeClr>
+              </a:lnRef>
+              <a:fillRef idx="1">
+                <a:schemeClr val="accent1"/>
+              </a:fillRef>
+              <a:effectRef idx="0">
+                <a:schemeClr val="accent1"/>
+              </a:effectRef>
+              <a:fontRef idx="minor">
+                <a:schemeClr val="lt1"/>
+              </a:fontRef>
+            </p:style>
+            <p:txBody>
+              <a:bodyPr rtlCol="0" anchor="ctr"/>
+              <a:lstStyle>
+                <a:defPPr>
+                  <a:defRPr lang="en-US"/>
+                </a:defPPr>
+                <a:lvl1pPr marL="0" algn="l" defTabSz="914400" rtl="0" eaLnBrk="1" latinLnBrk="0" hangingPunct="1">
+                  <a:defRPr sz="1800" kern="1200">
+                    <a:solidFill>
+                      <a:schemeClr val="lt1"/>
+                    </a:solidFill>
+                    <a:latin typeface="+mn-lt"/>
+                    <a:ea typeface="+mn-ea"/>
+                    <a:cs typeface="+mn-cs"/>
+                  </a:defRPr>
+                </a:lvl1pPr>
+                <a:lvl2pPr marL="457200" algn="l" defTabSz="914400" rtl="0" eaLnBrk="1" latinLnBrk="0" hangingPunct="1">
+                  <a:defRPr sz="1800" kern="1200">
+                    <a:solidFill>
+                      <a:schemeClr val="lt1"/>
+                    </a:solidFill>
+                    <a:latin typeface="+mn-lt"/>
+                    <a:ea typeface="+mn-ea"/>
+                    <a:cs typeface="+mn-cs"/>
+                  </a:defRPr>
+                </a:lvl2pPr>
+                <a:lvl3pPr marL="914400" algn="l" defTabSz="914400" rtl="0" eaLnBrk="1" latinLnBrk="0" hangingPunct="1">
+                  <a:defRPr sz="1800" kern="1200">
+                    <a:solidFill>
+                      <a:schemeClr val="lt1"/>
+                    </a:solidFill>
+                    <a:latin typeface="+mn-lt"/>
+                    <a:ea typeface="+mn-ea"/>
+                    <a:cs typeface="+mn-cs"/>
+                  </a:defRPr>
+                </a:lvl3pPr>
+                <a:lvl4pPr marL="1371600" algn="l" defTabSz="914400" rtl="0" eaLnBrk="1" latinLnBrk="0" hangingPunct="1">
+                  <a:defRPr sz="1800" kern="1200">
+                    <a:solidFill>
+                      <a:schemeClr val="lt1"/>
+                    </a:solidFill>
+                    <a:latin typeface="+mn-lt"/>
+                    <a:ea typeface="+mn-ea"/>
+                    <a:cs typeface="+mn-cs"/>
+                  </a:defRPr>
+                </a:lvl4pPr>
+                <a:lvl5pPr marL="1828800" algn="l" defTabSz="914400" rtl="0" eaLnBrk="1" latinLnBrk="0" hangingPunct="1">
+                  <a:defRPr sz="1800" kern="1200">
+                    <a:solidFill>
+                      <a:schemeClr val="lt1"/>
+                    </a:solidFill>
+                    <a:latin typeface="+mn-lt"/>
+                    <a:ea typeface="+mn-ea"/>
+                    <a:cs typeface="+mn-cs"/>
+                  </a:defRPr>
+                </a:lvl5pPr>
+                <a:lvl6pPr marL="2286000" algn="l" defTabSz="914400" rtl="0" eaLnBrk="1" latinLnBrk="0" hangingPunct="1">
+                  <a:defRPr sz="1800" kern="1200">
+                    <a:solidFill>
+                      <a:schemeClr val="lt1"/>
+                    </a:solidFill>
+                    <a:latin typeface="+mn-lt"/>
+                    <a:ea typeface="+mn-ea"/>
+                    <a:cs typeface="+mn-cs"/>
+                  </a:defRPr>
+                </a:lvl6pPr>
+                <a:lvl7pPr marL="2743200" algn="l" defTabSz="914400" rtl="0" eaLnBrk="1" latinLnBrk="0" hangingPunct="1">
+                  <a:defRPr sz="1800" kern="1200">
+                    <a:solidFill>
+                      <a:schemeClr val="lt1"/>
+                    </a:solidFill>
+                    <a:latin typeface="+mn-lt"/>
+                    <a:ea typeface="+mn-ea"/>
+                    <a:cs typeface="+mn-cs"/>
+                  </a:defRPr>
+                </a:lvl7pPr>
+                <a:lvl8pPr marL="3200400" algn="l" defTabSz="914400" rtl="0" eaLnBrk="1" latinLnBrk="0" hangingPunct="1">
+                  <a:defRPr sz="1800" kern="1200">
+                    <a:solidFill>
+                      <a:schemeClr val="lt1"/>
+                    </a:solidFill>
+                    <a:latin typeface="+mn-lt"/>
+                    <a:ea typeface="+mn-ea"/>
+                    <a:cs typeface="+mn-cs"/>
+                  </a:defRPr>
+                </a:lvl8pPr>
+                <a:lvl9pPr marL="3657600" algn="l" defTabSz="914400" rtl="0" eaLnBrk="1" latinLnBrk="0" hangingPunct="1">
+                  <a:defRPr sz="1800" kern="1200">
+                    <a:solidFill>
+                      <a:schemeClr val="lt1"/>
+                    </a:solidFill>
+                    <a:latin typeface="+mn-lt"/>
+                    <a:ea typeface="+mn-ea"/>
+                    <a:cs typeface="+mn-cs"/>
+                  </a:defRPr>
+                </a:lvl9pPr>
+              </a:lstStyle>
+              <a:p>
+                <a:pPr algn="ctr"/>
+                <a:endParaRPr lang="en-US"/>
+              </a:p>
+            </p:txBody>
+          </p:sp>
+          <p:cxnSp>
+            <p:nvCxnSpPr>
+              <p:cNvPr id="13" name="Straight Connector 12"/>
+              <p:cNvCxnSpPr>
+                <a:endCxn id="11" idx="2"/>
+              </p:cNvCxnSpPr>
+              <p:nvPr/>
+            </p:nvCxnSpPr>
+            <p:spPr>
+              <a:xfrm flipH="1" flipV="1">
+                <a:off x="983570" y="4764616"/>
+                <a:ext cx="2182483" cy="1"/>
+              </a:xfrm>
+              <a:prstGeom prst="line">
+                <a:avLst/>
+              </a:prstGeom>
+              <a:ln w="19050">
+                <a:solidFill>
+                  <a:schemeClr val="tx1"/>
+                </a:solidFill>
+                <a:prstDash val="sysDot"/>
+              </a:ln>
+            </p:spPr>
+            <p:style>
+              <a:lnRef idx="1">
+                <a:schemeClr val="accent1"/>
+              </a:lnRef>
+              <a:fillRef idx="0">
+                <a:schemeClr val="accent1"/>
+              </a:fillRef>
+              <a:effectRef idx="0">
+                <a:schemeClr val="accent1"/>
+              </a:effectRef>
+              <a:fontRef idx="minor">
+                <a:schemeClr val="tx1"/>
+              </a:fontRef>
+            </p:style>
+          </p:cxnSp>
+          <mc:AlternateContent xmlns:mc="http://schemas.openxmlformats.org/markup-compatibility/2006">
+            <mc:Choice xmlns:a14="http://schemas.microsoft.com/office/drawing/2010/main" Requires="a14">
+              <p:sp>
+                <p:nvSpPr>
+                  <p:cNvPr id="14" name="TextBox 13"/>
+                  <p:cNvSpPr txBox="1"/>
+                  <p:nvPr/>
+                </p:nvSpPr>
+                <p:spPr>
+                  <a:xfrm>
+                    <a:off x="2405174" y="4456838"/>
+                    <a:ext cx="222304" cy="307777"/>
+                  </a:xfrm>
+                  <a:prstGeom prst="rect">
+                    <a:avLst/>
+                  </a:prstGeom>
+                  <a:noFill/>
+                </p:spPr>
+                <p:txBody>
+                  <a:bodyPr wrap="none" lIns="0" tIns="0" rIns="0" bIns="0" rtlCol="0">
+                    <a:spAutoFit/>
+                  </a:bodyPr>
+                  <a:lstStyle>
+                    <a:defPPr>
+                      <a:defRPr lang="en-US"/>
+                    </a:defPPr>
+                    <a:lvl1pPr marL="0" algn="l" defTabSz="914400" rtl="0" eaLnBrk="1" latinLnBrk="0" hangingPunct="1">
+                      <a:defRPr sz="1800" kern="1200">
+                        <a:solidFill>
+                          <a:schemeClr val="tx1"/>
+                        </a:solidFill>
+                        <a:latin typeface="+mn-lt"/>
+                        <a:ea typeface="+mn-ea"/>
+                        <a:cs typeface="+mn-cs"/>
+                      </a:defRPr>
+                    </a:lvl1pPr>
+                    <a:lvl2pPr marL="457200" algn="l" defTabSz="914400" rtl="0" eaLnBrk="1" latinLnBrk="0" hangingPunct="1">
+                      <a:defRPr sz="1800" kern="1200">
+                        <a:solidFill>
+                          <a:schemeClr val="tx1"/>
+                        </a:solidFill>
+                        <a:latin typeface="+mn-lt"/>
+                        <a:ea typeface="+mn-ea"/>
+                        <a:cs typeface="+mn-cs"/>
+                      </a:defRPr>
+                    </a:lvl2pPr>
+                    <a:lvl3pPr marL="914400" algn="l" defTabSz="914400" rtl="0" eaLnBrk="1" latinLnBrk="0" hangingPunct="1">
+                      <a:defRPr sz="1800" kern="1200">
+                        <a:solidFill>
+                          <a:schemeClr val="tx1"/>
+                        </a:solidFill>
+                        <a:latin typeface="+mn-lt"/>
+                        <a:ea typeface="+mn-ea"/>
+                        <a:cs typeface="+mn-cs"/>
+                      </a:defRPr>
+                    </a:lvl3pPr>
+                    <a:lvl4pPr marL="1371600" algn="l" defTabSz="914400" rtl="0" eaLnBrk="1" latinLnBrk="0" hangingPunct="1">
+                      <a:defRPr sz="1800" kern="1200">
+                        <a:solidFill>
+                          <a:schemeClr val="tx1"/>
+                        </a:solidFill>
+                        <a:latin typeface="+mn-lt"/>
+                        <a:ea typeface="+mn-ea"/>
+                        <a:cs typeface="+mn-cs"/>
+                      </a:defRPr>
+                    </a:lvl4pPr>
+                    <a:lvl5pPr marL="1828800" algn="l" defTabSz="914400" rtl="0" eaLnBrk="1" latinLnBrk="0" hangingPunct="1">
+                      <a:defRPr sz="1800" kern="1200">
+                        <a:solidFill>
+                          <a:schemeClr val="tx1"/>
+                        </a:solidFill>
+                        <a:latin typeface="+mn-lt"/>
+                        <a:ea typeface="+mn-ea"/>
+                        <a:cs typeface="+mn-cs"/>
+                      </a:defRPr>
+                    </a:lvl5pPr>
+                    <a:lvl6pPr marL="2286000" algn="l" defTabSz="914400" rtl="0" eaLnBrk="1" latinLnBrk="0" hangingPunct="1">
+                      <a:defRPr sz="1800" kern="1200">
+                        <a:solidFill>
+                          <a:schemeClr val="tx1"/>
+                        </a:solidFill>
+                        <a:latin typeface="+mn-lt"/>
+                        <a:ea typeface="+mn-ea"/>
+                        <a:cs typeface="+mn-cs"/>
+                      </a:defRPr>
+                    </a:lvl6pPr>
+                    <a:lvl7pPr marL="2743200" algn="l" defTabSz="914400" rtl="0" eaLnBrk="1" latinLnBrk="0" hangingPunct="1">
+                      <a:defRPr sz="1800" kern="1200">
+                        <a:solidFill>
+                          <a:schemeClr val="tx1"/>
+                        </a:solidFill>
+                        <a:latin typeface="+mn-lt"/>
+                        <a:ea typeface="+mn-ea"/>
+                        <a:cs typeface="+mn-cs"/>
+                      </a:defRPr>
+                    </a:lvl7pPr>
+                    <a:lvl8pPr marL="3200400" algn="l" defTabSz="914400" rtl="0" eaLnBrk="1" latinLnBrk="0" hangingPunct="1">
+                      <a:defRPr sz="1800" kern="1200">
+                        <a:solidFill>
+                          <a:schemeClr val="tx1"/>
+                        </a:solidFill>
+                        <a:latin typeface="+mn-lt"/>
+                        <a:ea typeface="+mn-ea"/>
+                        <a:cs typeface="+mn-cs"/>
+                      </a:defRPr>
+                    </a:lvl8pPr>
+                    <a:lvl9pPr marL="3657600" algn="l" defTabSz="914400" rtl="0" eaLnBrk="1" latinLnBrk="0" hangingPunct="1">
+                      <a:defRPr sz="1800" kern="1200">
+                        <a:solidFill>
+                          <a:schemeClr val="tx1"/>
+                        </a:solidFill>
+                        <a:latin typeface="+mn-lt"/>
+                        <a:ea typeface="+mn-ea"/>
+                        <a:cs typeface="+mn-cs"/>
+                      </a:defRPr>
+                    </a:lvl9pPr>
+                  </a:lstStyle>
+                  <a:p>
+                    <a:pPr/>
+                    <a14:m>
+                      <m:oMathPara xmlns:m="http://schemas.openxmlformats.org/officeDocument/2006/math">
+                        <m:oMathParaPr>
+                          <m:jc m:val="centerGroup"/>
+                        </m:oMathParaPr>
+                        <m:oMath xmlns:m="http://schemas.openxmlformats.org/officeDocument/2006/math">
+                          <m:r>
+                            <a:rPr lang="en-US" sz="2000" b="0" i="1" smtClean="0">
+                              <a:latin typeface="Cambria Math" panose="02040503050406030204" pitchFamily="18" charset="0"/>
+                              <a:cs typeface="Arial" panose="020B0604020202020204" pitchFamily="34" charset="0"/>
+                            </a:rPr>
+                            <m:t>𝜃</m:t>
+                          </m:r>
+                        </m:oMath>
+                      </m:oMathPara>
+                    </a14:m>
+                    <a:endParaRPr lang="en-US" sz="2000" dirty="0" smtClean="0">
+                      <a:latin typeface="Arial" panose="020B0604020202020204" pitchFamily="34" charset="0"/>
+                      <a:cs typeface="Arial" panose="020B0604020202020204" pitchFamily="34" charset="0"/>
+                    </a:endParaRPr>
+                  </a:p>
+                </p:txBody>
+              </p:sp>
+            </mc:Choice>
+            <mc:Fallback>
+              <p:sp>
+                <p:nvSpPr>
+                  <p:cNvPr id="14" name="TextBox 13"/>
+                  <p:cNvSpPr txBox="1">
+                    <a:spLocks noRot="1" noChangeAspect="1" noMove="1" noResize="1" noEditPoints="1" noAdjustHandles="1" noChangeArrowheads="1" noChangeShapeType="1" noTextEdit="1"/>
+                  </p:cNvSpPr>
+                  <p:nvPr/>
+                </p:nvSpPr>
+                <p:spPr>
+                  <a:xfrm>
+                    <a:off x="2405174" y="4456838"/>
+                    <a:ext cx="222304" cy="307777"/>
+                  </a:xfrm>
+                  <a:prstGeom prst="rect">
+                    <a:avLst/>
+                  </a:prstGeom>
+                  <a:blipFill>
+                    <a:blip r:embed="rId2"/>
+                    <a:stretch>
+                      <a:fillRect l="-25000" r="-25000" b="-9804"/>
+                    </a:stretch>
+                  </a:blipFill>
+                </p:spPr>
+                <p:txBody>
+                  <a:bodyPr/>
+                  <a:lstStyle/>
+                  <a:p>
+                    <a:r>
+                      <a:rPr lang="en-US">
+                        <a:noFill/>
+                      </a:rPr>
+                      <a:t> </a:t>
+                    </a:r>
+                  </a:p>
+                </p:txBody>
+              </p:sp>
+            </mc:Fallback>
+          </mc:AlternateContent>
+          <mc:AlternateContent xmlns:mc="http://schemas.openxmlformats.org/markup-compatibility/2006">
+            <mc:Choice xmlns:a14="http://schemas.microsoft.com/office/drawing/2010/main" Requires="a14">
+              <p:sp>
+                <p:nvSpPr>
+                  <p:cNvPr id="15" name="TextBox 14"/>
+                  <p:cNvSpPr txBox="1"/>
+                  <p:nvPr/>
+                </p:nvSpPr>
+                <p:spPr>
+                  <a:xfrm>
+                    <a:off x="1861596" y="3642774"/>
+                    <a:ext cx="289695" cy="307777"/>
+                  </a:xfrm>
+                  <a:prstGeom prst="rect">
+                    <a:avLst/>
+                  </a:prstGeom>
+                  <a:noFill/>
+                </p:spPr>
+                <p:txBody>
+                  <a:bodyPr wrap="none" lIns="0" tIns="0" rIns="0" bIns="0" rtlCol="0">
+                    <a:spAutoFit/>
+                  </a:bodyPr>
+                  <a:lstStyle>
+                    <a:defPPr>
+                      <a:defRPr lang="en-US"/>
+                    </a:defPPr>
+                    <a:lvl1pPr marL="0" algn="l" defTabSz="914400" rtl="0" eaLnBrk="1" latinLnBrk="0" hangingPunct="1">
+                      <a:defRPr sz="1800" kern="1200">
+                        <a:solidFill>
+                          <a:schemeClr val="tx1"/>
+                        </a:solidFill>
+                        <a:latin typeface="+mn-lt"/>
+                        <a:ea typeface="+mn-ea"/>
+                        <a:cs typeface="+mn-cs"/>
+                      </a:defRPr>
+                    </a:lvl1pPr>
+                    <a:lvl2pPr marL="457200" algn="l" defTabSz="914400" rtl="0" eaLnBrk="1" latinLnBrk="0" hangingPunct="1">
+                      <a:defRPr sz="1800" kern="1200">
+                        <a:solidFill>
+                          <a:schemeClr val="tx1"/>
+                        </a:solidFill>
+                        <a:latin typeface="+mn-lt"/>
+                        <a:ea typeface="+mn-ea"/>
+                        <a:cs typeface="+mn-cs"/>
+                      </a:defRPr>
+                    </a:lvl2pPr>
+                    <a:lvl3pPr marL="914400" algn="l" defTabSz="914400" rtl="0" eaLnBrk="1" latinLnBrk="0" hangingPunct="1">
+                      <a:defRPr sz="1800" kern="1200">
+                        <a:solidFill>
+                          <a:schemeClr val="tx1"/>
+                        </a:solidFill>
+                        <a:latin typeface="+mn-lt"/>
+                        <a:ea typeface="+mn-ea"/>
+                        <a:cs typeface="+mn-cs"/>
+                      </a:defRPr>
+                    </a:lvl3pPr>
+                    <a:lvl4pPr marL="1371600" algn="l" defTabSz="914400" rtl="0" eaLnBrk="1" latinLnBrk="0" hangingPunct="1">
+                      <a:defRPr sz="1800" kern="1200">
+                        <a:solidFill>
+                          <a:schemeClr val="tx1"/>
+                        </a:solidFill>
+                        <a:latin typeface="+mn-lt"/>
+                        <a:ea typeface="+mn-ea"/>
+                        <a:cs typeface="+mn-cs"/>
+                      </a:defRPr>
+                    </a:lvl4pPr>
+                    <a:lvl5pPr marL="1828800" algn="l" defTabSz="914400" rtl="0" eaLnBrk="1" latinLnBrk="0" hangingPunct="1">
+                      <a:defRPr sz="1800" kern="1200">
+                        <a:solidFill>
+                          <a:schemeClr val="tx1"/>
+                        </a:solidFill>
+                        <a:latin typeface="+mn-lt"/>
+                        <a:ea typeface="+mn-ea"/>
+                        <a:cs typeface="+mn-cs"/>
+                      </a:defRPr>
+                    </a:lvl5pPr>
+                    <a:lvl6pPr marL="2286000" algn="l" defTabSz="914400" rtl="0" eaLnBrk="1" latinLnBrk="0" hangingPunct="1">
+                      <a:defRPr sz="1800" kern="1200">
+                        <a:solidFill>
+                          <a:schemeClr val="tx1"/>
+                        </a:solidFill>
+                        <a:latin typeface="+mn-lt"/>
+                        <a:ea typeface="+mn-ea"/>
+                        <a:cs typeface="+mn-cs"/>
+                      </a:defRPr>
+                    </a:lvl6pPr>
+                    <a:lvl7pPr marL="2743200" algn="l" defTabSz="914400" rtl="0" eaLnBrk="1" latinLnBrk="0" hangingPunct="1">
+                      <a:defRPr sz="1800" kern="1200">
+                        <a:solidFill>
+                          <a:schemeClr val="tx1"/>
+                        </a:solidFill>
+                        <a:latin typeface="+mn-lt"/>
+                        <a:ea typeface="+mn-ea"/>
+                        <a:cs typeface="+mn-cs"/>
+                      </a:defRPr>
+                    </a:lvl7pPr>
+                    <a:lvl8pPr marL="3200400" algn="l" defTabSz="914400" rtl="0" eaLnBrk="1" latinLnBrk="0" hangingPunct="1">
+                      <a:defRPr sz="1800" kern="1200">
+                        <a:solidFill>
+                          <a:schemeClr val="tx1"/>
+                        </a:solidFill>
+                        <a:latin typeface="+mn-lt"/>
+                        <a:ea typeface="+mn-ea"/>
+                        <a:cs typeface="+mn-cs"/>
+                      </a:defRPr>
+                    </a:lvl8pPr>
+                    <a:lvl9pPr marL="3657600" algn="l" defTabSz="914400" rtl="0" eaLnBrk="1" latinLnBrk="0" hangingPunct="1">
+                      <a:defRPr sz="1800" kern="1200">
+                        <a:solidFill>
+                          <a:schemeClr val="tx1"/>
+                        </a:solidFill>
+                        <a:latin typeface="+mn-lt"/>
+                        <a:ea typeface="+mn-ea"/>
+                        <a:cs typeface="+mn-cs"/>
+                      </a:defRPr>
+                    </a:lvl9pPr>
+                  </a:lstStyle>
+                  <a:p>
+                    <a:pPr/>
+                    <a14:m>
+                      <m:oMathPara xmlns:m="http://schemas.openxmlformats.org/officeDocument/2006/math">
+                        <m:oMathParaPr>
+                          <m:jc m:val="centerGroup"/>
+                        </m:oMathParaPr>
+                        <m:oMath xmlns:m="http://schemas.openxmlformats.org/officeDocument/2006/math">
+                          <m:r>
+                            <a:rPr lang="en-US" sz="2000" b="0" i="1" smtClean="0">
+                              <a:latin typeface="Cambria Math" panose="02040503050406030204" pitchFamily="18" charset="0"/>
+                              <a:cs typeface="Arial" panose="020B0604020202020204" pitchFamily="34" charset="0"/>
+                            </a:rPr>
+                            <m:t>𝑚</m:t>
+                          </m:r>
+                        </m:oMath>
+                      </m:oMathPara>
+                    </a14:m>
+                    <a:endParaRPr lang="en-US" sz="2000" dirty="0" smtClean="0">
+                      <a:latin typeface="Arial" panose="020B0604020202020204" pitchFamily="34" charset="0"/>
+                      <a:cs typeface="Arial" panose="020B0604020202020204" pitchFamily="34" charset="0"/>
+                    </a:endParaRPr>
+                  </a:p>
+                </p:txBody>
+              </p:sp>
+            </mc:Choice>
+            <mc:Fallback>
+              <p:sp>
+                <p:nvSpPr>
+                  <p:cNvPr id="15" name="TextBox 14"/>
+                  <p:cNvSpPr txBox="1">
+                    <a:spLocks noRot="1" noChangeAspect="1" noMove="1" noResize="1" noEditPoints="1" noAdjustHandles="1" noChangeArrowheads="1" noChangeShapeType="1" noTextEdit="1"/>
+                  </p:cNvSpPr>
+                  <p:nvPr/>
+                </p:nvSpPr>
+                <p:spPr>
+                  <a:xfrm>
+                    <a:off x="1861596" y="3642774"/>
+                    <a:ext cx="289695" cy="307777"/>
+                  </a:xfrm>
+                  <a:prstGeom prst="rect">
+                    <a:avLst/>
+                  </a:prstGeom>
+                  <a:blipFill>
+                    <a:blip r:embed="rId3"/>
+                    <a:stretch>
+                      <a:fillRect l="-10638" r="-8511" b="-2000"/>
+                    </a:stretch>
+                  </a:blipFill>
+                </p:spPr>
+                <p:txBody>
+                  <a:bodyPr/>
+                  <a:lstStyle/>
+                  <a:p>
+                    <a:r>
+                      <a:rPr lang="en-US">
+                        <a:noFill/>
+                      </a:rPr>
+                      <a:t> </a:t>
+                    </a:r>
+                  </a:p>
+                </p:txBody>
+              </p:sp>
+            </mc:Fallback>
+          </mc:AlternateContent>
+        </p:grpSp>
+        <p:sp>
+          <p:nvSpPr>
+            <p:cNvPr id="6" name="Rectangle 5"/>
+            <p:cNvSpPr/>
+            <p:nvPr/>
+          </p:nvSpPr>
+          <p:spPr>
+            <a:xfrm>
+              <a:off x="4015181" y="3772155"/>
+              <a:ext cx="569343" cy="629728"/>
+            </a:xfrm>
+            <a:prstGeom prst="rect">
+              <a:avLst/>
+            </a:prstGeom>
+            <a:solidFill>
+              <a:schemeClr val="bg2">
+                <a:lumMod val="90000"/>
+              </a:schemeClr>
+            </a:solidFill>
+            <a:ln w="38100">
+              <a:solidFill>
+                <a:schemeClr val="tx1"/>
+              </a:solidFill>
+              <a:prstDash val="sysDash"/>
+            </a:ln>
+          </p:spPr>
+          <p:style>
+            <a:lnRef idx="2">
+              <a:schemeClr val="accent1">
+                <a:shade val="50000"/>
+              </a:schemeClr>
+            </a:lnRef>
+            <a:fillRef idx="1">
+              <a:schemeClr val="accent1"/>
+            </a:fillRef>
+            <a:effectRef idx="0">
+              <a:schemeClr val="accent1"/>
+            </a:effectRef>
+            <a:fontRef idx="minor">
+              <a:schemeClr val="lt1"/>
+            </a:fontRef>
+          </p:style>
+          <p:txBody>
+            <a:bodyPr rtlCol="0" anchor="ctr"/>
+            <a:lstStyle>
+              <a:defPPr>
+                <a:defRPr lang="en-US"/>
+              </a:defPPr>
+              <a:lvl1pPr marL="0" algn="l" defTabSz="914400" rtl="0" eaLnBrk="1" latinLnBrk="0" hangingPunct="1">
+                <a:defRPr sz="1800" kern="1200">
+                  <a:solidFill>
+                    <a:schemeClr val="lt1"/>
+                  </a:solidFill>
+                  <a:latin typeface="+mn-lt"/>
+                  <a:ea typeface="+mn-ea"/>
+                  <a:cs typeface="+mn-cs"/>
+                </a:defRPr>
+              </a:lvl1pPr>
+              <a:lvl2pPr marL="457200" algn="l" defTabSz="914400" rtl="0" eaLnBrk="1" latinLnBrk="0" hangingPunct="1">
+                <a:defRPr sz="1800" kern="1200">
+                  <a:solidFill>
+                    <a:schemeClr val="lt1"/>
+                  </a:solidFill>
+                  <a:latin typeface="+mn-lt"/>
+                  <a:ea typeface="+mn-ea"/>
+                  <a:cs typeface="+mn-cs"/>
+                </a:defRPr>
+              </a:lvl2pPr>
+              <a:lvl3pPr marL="914400" algn="l" defTabSz="914400" rtl="0" eaLnBrk="1" latinLnBrk="0" hangingPunct="1">
+                <a:defRPr sz="1800" kern="1200">
+                  <a:solidFill>
+                    <a:schemeClr val="lt1"/>
+                  </a:solidFill>
+                  <a:latin typeface="+mn-lt"/>
+                  <a:ea typeface="+mn-ea"/>
+                  <a:cs typeface="+mn-cs"/>
+                </a:defRPr>
+              </a:lvl3pPr>
+              <a:lvl4pPr marL="1371600" algn="l" defTabSz="914400" rtl="0" eaLnBrk="1" latinLnBrk="0" hangingPunct="1">
+                <a:defRPr sz="1800" kern="1200">
+                  <a:solidFill>
+                    <a:schemeClr val="lt1"/>
+                  </a:solidFill>
+                  <a:latin typeface="+mn-lt"/>
+                  <a:ea typeface="+mn-ea"/>
+                  <a:cs typeface="+mn-cs"/>
+                </a:defRPr>
+              </a:lvl4pPr>
+              <a:lvl5pPr marL="1828800" algn="l" defTabSz="914400" rtl="0" eaLnBrk="1" latinLnBrk="0" hangingPunct="1">
+                <a:defRPr sz="1800" kern="1200">
+                  <a:solidFill>
+                    <a:schemeClr val="lt1"/>
+                  </a:solidFill>
+                  <a:latin typeface="+mn-lt"/>
+                  <a:ea typeface="+mn-ea"/>
+                  <a:cs typeface="+mn-cs"/>
+                </a:defRPr>
+              </a:lvl5pPr>
+              <a:lvl6pPr marL="2286000" algn="l" defTabSz="914400" rtl="0" eaLnBrk="1" latinLnBrk="0" hangingPunct="1">
+                <a:defRPr sz="1800" kern="1200">
+                  <a:solidFill>
+                    <a:schemeClr val="lt1"/>
+                  </a:solidFill>
+                  <a:latin typeface="+mn-lt"/>
+                  <a:ea typeface="+mn-ea"/>
+                  <a:cs typeface="+mn-cs"/>
+                </a:defRPr>
+              </a:lvl6pPr>
+              <a:lvl7pPr marL="2743200" algn="l" defTabSz="914400" rtl="0" eaLnBrk="1" latinLnBrk="0" hangingPunct="1">
+                <a:defRPr sz="1800" kern="1200">
+                  <a:solidFill>
+                    <a:schemeClr val="lt1"/>
+                  </a:solidFill>
+                  <a:latin typeface="+mn-lt"/>
+                  <a:ea typeface="+mn-ea"/>
+                  <a:cs typeface="+mn-cs"/>
+                </a:defRPr>
+              </a:lvl7pPr>
+              <a:lvl8pPr marL="3200400" algn="l" defTabSz="914400" rtl="0" eaLnBrk="1" latinLnBrk="0" hangingPunct="1">
+                <a:defRPr sz="1800" kern="1200">
+                  <a:solidFill>
+                    <a:schemeClr val="lt1"/>
+                  </a:solidFill>
+                  <a:latin typeface="+mn-lt"/>
+                  <a:ea typeface="+mn-ea"/>
+                  <a:cs typeface="+mn-cs"/>
+                </a:defRPr>
+              </a:lvl8pPr>
+              <a:lvl9pPr marL="3657600" algn="l" defTabSz="914400" rtl="0" eaLnBrk="1" latinLnBrk="0" hangingPunct="1">
+                <a:defRPr sz="1800" kern="1200">
+                  <a:solidFill>
+                    <a:schemeClr val="lt1"/>
+                  </a:solidFill>
+                  <a:latin typeface="+mn-lt"/>
+                  <a:ea typeface="+mn-ea"/>
+                  <a:cs typeface="+mn-cs"/>
+                </a:defRPr>
+              </a:lvl9pPr>
+            </a:lstStyle>
+            <a:p>
+              <a:pPr algn="ctr"/>
+              <a:endParaRPr lang="en-US"/>
+            </a:p>
+          </p:txBody>
+        </p:sp>
+        <mc:AlternateContent xmlns:mc="http://schemas.openxmlformats.org/markup-compatibility/2006">
+          <mc:Choice xmlns:a14="http://schemas.microsoft.com/office/drawing/2010/main" Requires="a14">
+            <p:sp>
+              <p:nvSpPr>
+                <p:cNvPr id="7" name="TextBox 67"/>
+                <p:cNvSpPr txBox="1"/>
+                <p:nvPr/>
+              </p:nvSpPr>
+              <p:spPr>
+                <a:xfrm>
+                  <a:off x="4155006" y="3891302"/>
+                  <a:ext cx="289695" cy="307777"/>
+                </a:xfrm>
+                <a:prstGeom prst="rect">
+                  <a:avLst/>
+                </a:prstGeom>
+                <a:noFill/>
+              </p:spPr>
+              <p:txBody>
+                <a:bodyPr wrap="none" lIns="0" tIns="0" rIns="0" bIns="0" rtlCol="0">
+                  <a:spAutoFit/>
+                </a:bodyPr>
+                <a:lstStyle>
+                  <a:defPPr>
+                    <a:defRPr lang="en-US"/>
+                  </a:defPPr>
+                  <a:lvl1pPr marL="0" algn="l" defTabSz="914400" rtl="0" eaLnBrk="1" latinLnBrk="0" hangingPunct="1">
+                    <a:defRPr sz="1800" kern="1200">
+                      <a:solidFill>
+                        <a:schemeClr val="tx1"/>
+                      </a:solidFill>
+                      <a:latin typeface="+mn-lt"/>
+                      <a:ea typeface="+mn-ea"/>
+                      <a:cs typeface="+mn-cs"/>
+                    </a:defRPr>
+                  </a:lvl1pPr>
+                  <a:lvl2pPr marL="457200" algn="l" defTabSz="914400" rtl="0" eaLnBrk="1" latinLnBrk="0" hangingPunct="1">
+                    <a:defRPr sz="1800" kern="1200">
+                      <a:solidFill>
+                        <a:schemeClr val="tx1"/>
+                      </a:solidFill>
+                      <a:latin typeface="+mn-lt"/>
+                      <a:ea typeface="+mn-ea"/>
+                      <a:cs typeface="+mn-cs"/>
+                    </a:defRPr>
+                  </a:lvl2pPr>
+                  <a:lvl3pPr marL="914400" algn="l" defTabSz="914400" rtl="0" eaLnBrk="1" latinLnBrk="0" hangingPunct="1">
+                    <a:defRPr sz="1800" kern="1200">
+                      <a:solidFill>
+                        <a:schemeClr val="tx1"/>
+                      </a:solidFill>
+                      <a:latin typeface="+mn-lt"/>
+                      <a:ea typeface="+mn-ea"/>
+                      <a:cs typeface="+mn-cs"/>
+                    </a:defRPr>
+                  </a:lvl3pPr>
+                  <a:lvl4pPr marL="1371600" algn="l" defTabSz="914400" rtl="0" eaLnBrk="1" latinLnBrk="0" hangingPunct="1">
+                    <a:defRPr sz="1800" kern="1200">
+                      <a:solidFill>
+                        <a:schemeClr val="tx1"/>
+                      </a:solidFill>
+                      <a:latin typeface="+mn-lt"/>
+                      <a:ea typeface="+mn-ea"/>
+                      <a:cs typeface="+mn-cs"/>
+                    </a:defRPr>
+                  </a:lvl4pPr>
+                  <a:lvl5pPr marL="1828800" algn="l" defTabSz="914400" rtl="0" eaLnBrk="1" latinLnBrk="0" hangingPunct="1">
+                    <a:defRPr sz="1800" kern="1200">
+                      <a:solidFill>
+                        <a:schemeClr val="tx1"/>
+                      </a:solidFill>
+                      <a:latin typeface="+mn-lt"/>
+                      <a:ea typeface="+mn-ea"/>
+                      <a:cs typeface="+mn-cs"/>
+                    </a:defRPr>
+                  </a:lvl5pPr>
+                  <a:lvl6pPr marL="2286000" algn="l" defTabSz="914400" rtl="0" eaLnBrk="1" latinLnBrk="0" hangingPunct="1">
+                    <a:defRPr sz="1800" kern="1200">
+                      <a:solidFill>
+                        <a:schemeClr val="tx1"/>
+                      </a:solidFill>
+                      <a:latin typeface="+mn-lt"/>
+                      <a:ea typeface="+mn-ea"/>
+                      <a:cs typeface="+mn-cs"/>
+                    </a:defRPr>
+                  </a:lvl6pPr>
+                  <a:lvl7pPr marL="2743200" algn="l" defTabSz="914400" rtl="0" eaLnBrk="1" latinLnBrk="0" hangingPunct="1">
+                    <a:defRPr sz="1800" kern="1200">
+                      <a:solidFill>
+                        <a:schemeClr val="tx1"/>
+                      </a:solidFill>
+                      <a:latin typeface="+mn-lt"/>
+                      <a:ea typeface="+mn-ea"/>
+                      <a:cs typeface="+mn-cs"/>
+                    </a:defRPr>
+                  </a:lvl7pPr>
+                  <a:lvl8pPr marL="3200400" algn="l" defTabSz="914400" rtl="0" eaLnBrk="1" latinLnBrk="0" hangingPunct="1">
+                    <a:defRPr sz="1800" kern="1200">
+                      <a:solidFill>
+                        <a:schemeClr val="tx1"/>
+                      </a:solidFill>
+                      <a:latin typeface="+mn-lt"/>
+                      <a:ea typeface="+mn-ea"/>
+                      <a:cs typeface="+mn-cs"/>
+                    </a:defRPr>
+                  </a:lvl8pPr>
+                  <a:lvl9pPr marL="3657600" algn="l" defTabSz="914400" rtl="0" eaLnBrk="1" latinLnBrk="0" hangingPunct="1">
+                    <a:defRPr sz="1800" kern="1200">
+                      <a:solidFill>
+                        <a:schemeClr val="tx1"/>
+                      </a:solidFill>
+                      <a:latin typeface="+mn-lt"/>
+                      <a:ea typeface="+mn-ea"/>
+                      <a:cs typeface="+mn-cs"/>
+                    </a:defRPr>
+                  </a:lvl9pPr>
+                </a:lstStyle>
+                <a:p>
+                  <a:pPr/>
+                  <a14:m>
+                    <m:oMathPara xmlns:m="http://schemas.openxmlformats.org/officeDocument/2006/math">
+                      <m:oMathParaPr>
+                        <m:jc m:val="centerGroup"/>
+                      </m:oMathParaPr>
+                      <m:oMath xmlns:m="http://schemas.openxmlformats.org/officeDocument/2006/math">
+                        <m:r>
+                          <a:rPr lang="en-US" sz="2000" b="0" i="1" smtClean="0">
+                            <a:latin typeface="Cambria Math" panose="02040503050406030204" pitchFamily="18" charset="0"/>
+                            <a:cs typeface="Arial" panose="020B0604020202020204" pitchFamily="34" charset="0"/>
+                          </a:rPr>
+                          <m:t>𝑚</m:t>
+                        </m:r>
+                      </m:oMath>
+                    </m:oMathPara>
+                  </a14:m>
+                  <a:endParaRPr lang="en-US" sz="2000" dirty="0" smtClean="0">
+                    <a:latin typeface="Arial" panose="020B0604020202020204" pitchFamily="34" charset="0"/>
+                    <a:cs typeface="Arial" panose="020B0604020202020204" pitchFamily="34" charset="0"/>
+                  </a:endParaRPr>
+                </a:p>
+              </p:txBody>
+            </p:sp>
+          </mc:Choice>
+          <mc:Fallback>
+            <p:sp>
+              <p:nvSpPr>
+                <p:cNvPr id="7" name="TextBox 67"/>
+                <p:cNvSpPr txBox="1">
+                  <a:spLocks noRot="1" noChangeAspect="1" noMove="1" noResize="1" noEditPoints="1" noAdjustHandles="1" noChangeArrowheads="1" noChangeShapeType="1" noTextEdit="1"/>
+                </p:cNvSpPr>
+                <p:nvPr/>
+              </p:nvSpPr>
+              <p:spPr>
+                <a:xfrm>
+                  <a:off x="4155006" y="3891302"/>
+                  <a:ext cx="289695" cy="307777"/>
+                </a:xfrm>
+                <a:prstGeom prst="rect">
+                  <a:avLst/>
+                </a:prstGeom>
+                <a:blipFill>
+                  <a:blip r:embed="rId4"/>
+                  <a:stretch>
+                    <a:fillRect l="-8333" r="-8333" b="-1961"/>
+                  </a:stretch>
+                </a:blipFill>
+              </p:spPr>
+              <p:txBody>
+                <a:bodyPr/>
+                <a:lstStyle/>
+                <a:p>
+                  <a:r>
+                    <a:rPr lang="en-US">
+                      <a:noFill/>
+                    </a:rPr>
+                    <a:t> </a:t>
+                  </a:r>
+                </a:p>
+              </p:txBody>
+            </p:sp>
+          </mc:Fallback>
+        </mc:AlternateContent>
+        <p:cxnSp>
+          <p:nvCxnSpPr>
+            <p:cNvPr id="8" name="Straight Arrow Connector 7"/>
+            <p:cNvCxnSpPr>
+              <a:stCxn id="10" idx="3"/>
+            </p:cNvCxnSpPr>
+            <p:nvPr/>
+          </p:nvCxnSpPr>
+          <p:spPr>
+            <a:xfrm>
+              <a:off x="2025528" y="3590614"/>
+              <a:ext cx="1005864" cy="520136"/>
+            </a:xfrm>
+            <a:prstGeom prst="straightConnector1">
+              <a:avLst/>
+            </a:prstGeom>
+            <a:ln w="38100">
+              <a:solidFill>
+                <a:schemeClr val="tx1"/>
+              </a:solidFill>
+              <a:headEnd type="triangle"/>
+              <a:tailEnd type="triangle"/>
+            </a:ln>
+          </p:spPr>
+          <p:style>
+            <a:lnRef idx="1">
+              <a:schemeClr val="accent1"/>
+            </a:lnRef>
+            <a:fillRef idx="0">
+              <a:schemeClr val="accent1"/>
+            </a:fillRef>
+            <a:effectRef idx="0">
+              <a:schemeClr val="accent1"/>
+            </a:effectRef>
+            <a:fontRef idx="minor">
+              <a:schemeClr val="tx1"/>
+            </a:fontRef>
+          </p:style>
+        </p:cxnSp>
+        <mc:AlternateContent xmlns:mc="http://schemas.openxmlformats.org/markup-compatibility/2006">
+          <mc:Choice xmlns:a14="http://schemas.microsoft.com/office/drawing/2010/main" Requires="a14">
+            <p:sp>
+              <p:nvSpPr>
+                <p:cNvPr id="9" name="TextBox 72"/>
+                <p:cNvSpPr txBox="1"/>
+                <p:nvPr/>
+              </p:nvSpPr>
+              <p:spPr>
+                <a:xfrm>
+                  <a:off x="2548192" y="3457734"/>
+                  <a:ext cx="212045" cy="307777"/>
+                </a:xfrm>
+                <a:prstGeom prst="rect">
+                  <a:avLst/>
+                </a:prstGeom>
+                <a:noFill/>
+              </p:spPr>
+              <p:txBody>
+                <a:bodyPr wrap="none" lIns="0" tIns="0" rIns="0" bIns="0" rtlCol="0">
+                  <a:spAutoFit/>
+                </a:bodyPr>
+                <a:lstStyle>
+                  <a:defPPr>
+                    <a:defRPr lang="en-US"/>
+                  </a:defPPr>
+                  <a:lvl1pPr marL="0" algn="l" defTabSz="914400" rtl="0" eaLnBrk="1" latinLnBrk="0" hangingPunct="1">
+                    <a:defRPr sz="1800" kern="1200">
+                      <a:solidFill>
+                        <a:schemeClr val="tx1"/>
+                      </a:solidFill>
+                      <a:latin typeface="+mn-lt"/>
+                      <a:ea typeface="+mn-ea"/>
+                      <a:cs typeface="+mn-cs"/>
+                    </a:defRPr>
+                  </a:lvl1pPr>
+                  <a:lvl2pPr marL="457200" algn="l" defTabSz="914400" rtl="0" eaLnBrk="1" latinLnBrk="0" hangingPunct="1">
+                    <a:defRPr sz="1800" kern="1200">
+                      <a:solidFill>
+                        <a:schemeClr val="tx1"/>
+                      </a:solidFill>
+                      <a:latin typeface="+mn-lt"/>
+                      <a:ea typeface="+mn-ea"/>
+                      <a:cs typeface="+mn-cs"/>
+                    </a:defRPr>
+                  </a:lvl2pPr>
+                  <a:lvl3pPr marL="914400" algn="l" defTabSz="914400" rtl="0" eaLnBrk="1" latinLnBrk="0" hangingPunct="1">
+                    <a:defRPr sz="1800" kern="1200">
+                      <a:solidFill>
+                        <a:schemeClr val="tx1"/>
+                      </a:solidFill>
+                      <a:latin typeface="+mn-lt"/>
+                      <a:ea typeface="+mn-ea"/>
+                      <a:cs typeface="+mn-cs"/>
+                    </a:defRPr>
+                  </a:lvl3pPr>
+                  <a:lvl4pPr marL="1371600" algn="l" defTabSz="914400" rtl="0" eaLnBrk="1" latinLnBrk="0" hangingPunct="1">
+                    <a:defRPr sz="1800" kern="1200">
+                      <a:solidFill>
+                        <a:schemeClr val="tx1"/>
+                      </a:solidFill>
+                      <a:latin typeface="+mn-lt"/>
+                      <a:ea typeface="+mn-ea"/>
+                      <a:cs typeface="+mn-cs"/>
+                    </a:defRPr>
+                  </a:lvl4pPr>
+                  <a:lvl5pPr marL="1828800" algn="l" defTabSz="914400" rtl="0" eaLnBrk="1" latinLnBrk="0" hangingPunct="1">
+                    <a:defRPr sz="1800" kern="1200">
+                      <a:solidFill>
+                        <a:schemeClr val="tx1"/>
+                      </a:solidFill>
+                      <a:latin typeface="+mn-lt"/>
+                      <a:ea typeface="+mn-ea"/>
+                      <a:cs typeface="+mn-cs"/>
+                    </a:defRPr>
+                  </a:lvl5pPr>
+                  <a:lvl6pPr marL="2286000" algn="l" defTabSz="914400" rtl="0" eaLnBrk="1" latinLnBrk="0" hangingPunct="1">
+                    <a:defRPr sz="1800" kern="1200">
+                      <a:solidFill>
+                        <a:schemeClr val="tx1"/>
+                      </a:solidFill>
+                      <a:latin typeface="+mn-lt"/>
+                      <a:ea typeface="+mn-ea"/>
+                      <a:cs typeface="+mn-cs"/>
+                    </a:defRPr>
+                  </a:lvl6pPr>
+                  <a:lvl7pPr marL="2743200" algn="l" defTabSz="914400" rtl="0" eaLnBrk="1" latinLnBrk="0" hangingPunct="1">
+                    <a:defRPr sz="1800" kern="1200">
+                      <a:solidFill>
+                        <a:schemeClr val="tx1"/>
+                      </a:solidFill>
+                      <a:latin typeface="+mn-lt"/>
+                      <a:ea typeface="+mn-ea"/>
+                      <a:cs typeface="+mn-cs"/>
+                    </a:defRPr>
+                  </a:lvl7pPr>
+                  <a:lvl8pPr marL="3200400" algn="l" defTabSz="914400" rtl="0" eaLnBrk="1" latinLnBrk="0" hangingPunct="1">
+                    <a:defRPr sz="1800" kern="1200">
+                      <a:solidFill>
+                        <a:schemeClr val="tx1"/>
+                      </a:solidFill>
+                      <a:latin typeface="+mn-lt"/>
+                      <a:ea typeface="+mn-ea"/>
+                      <a:cs typeface="+mn-cs"/>
+                    </a:defRPr>
+                  </a:lvl8pPr>
+                  <a:lvl9pPr marL="3657600" algn="l" defTabSz="914400" rtl="0" eaLnBrk="1" latinLnBrk="0" hangingPunct="1">
+                    <a:defRPr sz="1800" kern="1200">
+                      <a:solidFill>
+                        <a:schemeClr val="tx1"/>
+                      </a:solidFill>
+                      <a:latin typeface="+mn-lt"/>
+                      <a:ea typeface="+mn-ea"/>
+                      <a:cs typeface="+mn-cs"/>
+                    </a:defRPr>
+                  </a:lvl9pPr>
+                </a:lstStyle>
+                <a:p>
+                  <a:pPr/>
+                  <a14:m>
+                    <m:oMathPara xmlns:m="http://schemas.openxmlformats.org/officeDocument/2006/math">
+                      <m:oMathParaPr>
+                        <m:jc m:val="centerGroup"/>
+                      </m:oMathParaPr>
+                      <m:oMath xmlns:m="http://schemas.openxmlformats.org/officeDocument/2006/math">
+                        <m:r>
+                          <a:rPr lang="en-US" sz="2000" b="0" i="1" smtClean="0">
+                            <a:latin typeface="Cambria Math" panose="02040503050406030204" pitchFamily="18" charset="0"/>
+                            <a:cs typeface="Arial" panose="020B0604020202020204" pitchFamily="34" charset="0"/>
+                          </a:rPr>
+                          <m:t>𝐿</m:t>
+                        </m:r>
+                      </m:oMath>
+                    </m:oMathPara>
+                  </a14:m>
+                  <a:endParaRPr lang="en-US" sz="2000" dirty="0" smtClean="0">
+                    <a:latin typeface="Arial" panose="020B0604020202020204" pitchFamily="34" charset="0"/>
+                    <a:cs typeface="Arial" panose="020B0604020202020204" pitchFamily="34" charset="0"/>
+                  </a:endParaRPr>
+                </a:p>
+              </p:txBody>
+            </p:sp>
+          </mc:Choice>
+          <mc:Fallback>
+            <p:sp>
+              <p:nvSpPr>
+                <p:cNvPr id="9" name="TextBox 72"/>
+                <p:cNvSpPr txBox="1">
+                  <a:spLocks noRot="1" noChangeAspect="1" noMove="1" noResize="1" noEditPoints="1" noAdjustHandles="1" noChangeArrowheads="1" noChangeShapeType="1" noTextEdit="1"/>
+                </p:cNvSpPr>
+                <p:nvPr/>
+              </p:nvSpPr>
+              <p:spPr>
+                <a:xfrm>
+                  <a:off x="2548192" y="3457734"/>
+                  <a:ext cx="212045" cy="307777"/>
+                </a:xfrm>
+                <a:prstGeom prst="rect">
+                  <a:avLst/>
+                </a:prstGeom>
+                <a:blipFill>
+                  <a:blip r:embed="rId5"/>
+                  <a:stretch>
+                    <a:fillRect l="-26471" r="-23529" b="-9804"/>
+                  </a:stretch>
+                </a:blipFill>
+              </p:spPr>
+              <p:txBody>
+                <a:bodyPr/>
+                <a:lstStyle/>
+                <a:p>
+                  <a:r>
+                    <a:rPr lang="en-US">
+                      <a:noFill/>
+                    </a:rPr>
+                    <a:t> </a:t>
+                  </a:r>
+                </a:p>
+              </p:txBody>
+            </p:sp>
+          </mc:Fallback>
+        </mc:AlternateContent>
+      </p:grpSp>
+      <mc:AlternateContent xmlns:mc="http://schemas.openxmlformats.org/markup-compatibility/2006">
+        <mc:Choice xmlns:a14="http://schemas.microsoft.com/office/drawing/2010/main" Requires="a14">
+          <p:sp>
+            <p:nvSpPr>
+              <p:cNvPr id="16" name="TextBox 15"/>
+              <p:cNvSpPr txBox="1"/>
+              <p:nvPr/>
+            </p:nvSpPr>
+            <p:spPr>
+              <a:xfrm>
+                <a:off x="1408064" y="2646279"/>
+                <a:ext cx="234936" cy="307777"/>
+              </a:xfrm>
+              <a:prstGeom prst="rect">
+                <a:avLst/>
+              </a:prstGeom>
+              <a:noFill/>
+            </p:spPr>
+            <p:txBody>
+              <a:bodyPr wrap="none" lIns="0" tIns="0" rIns="0" bIns="0" rtlCol="0">
+                <a:spAutoFit/>
+              </a:bodyPr>
+              <a:lstStyle/>
+              <a:p>
+                <a14:m>
+                  <m:oMathPara xmlns:m="http://schemas.openxmlformats.org/officeDocument/2006/math">
+                    <m:oMathParaPr>
+                      <m:jc m:val="centerGroup"/>
+                    </m:oMathParaPr>
+                    <m:oMath xmlns:m="http://schemas.openxmlformats.org/officeDocument/2006/math">
+                      <m:r>
+                        <a:rPr lang="en-US" sz="2000" b="0" i="1" smtClean="0">
+                          <a:latin typeface="Cambria Math" panose="02040503050406030204" pitchFamily="18" charset="0"/>
+                          <a:cs typeface="Arial" panose="020B0604020202020204" pitchFamily="34" charset="0"/>
+                        </a:rPr>
+                        <m:t>𝐴</m:t>
+                      </m:r>
+                    </m:oMath>
+                  </m:oMathPara>
+                </a14:m>
+                <a:endParaRPr lang="en-US" sz="2000" dirty="0" smtClean="0">
+                  <a:latin typeface="Arial" panose="020B0604020202020204" pitchFamily="34" charset="0"/>
+                  <a:cs typeface="Arial" panose="020B0604020202020204" pitchFamily="34" charset="0"/>
+                </a:endParaRPr>
+              </a:p>
+            </p:txBody>
+          </p:sp>
+        </mc:Choice>
+        <mc:Fallback>
+          <p:sp>
+            <p:nvSpPr>
+              <p:cNvPr id="16" name="TextBox 15"/>
+              <p:cNvSpPr txBox="1">
+                <a:spLocks noRot="1" noChangeAspect="1" noMove="1" noResize="1" noEditPoints="1" noAdjustHandles="1" noChangeArrowheads="1" noChangeShapeType="1" noTextEdit="1"/>
+              </p:cNvSpPr>
+              <p:nvPr/>
+            </p:nvSpPr>
+            <p:spPr>
+              <a:xfrm>
+                <a:off x="1408064" y="2646279"/>
+                <a:ext cx="234936" cy="307777"/>
+              </a:xfrm>
+              <a:prstGeom prst="rect">
+                <a:avLst/>
+              </a:prstGeom>
+              <a:blipFill>
+                <a:blip r:embed="rId6"/>
+                <a:stretch>
+                  <a:fillRect l="-23077" r="-20513" b="-9804"/>
+                </a:stretch>
+              </a:blipFill>
+            </p:spPr>
+            <p:txBody>
+              <a:bodyPr/>
+              <a:lstStyle/>
+              <a:p>
+                <a:r>
+                  <a:rPr lang="en-US">
+                    <a:noFill/>
+                  </a:rPr>
+                  <a:t> </a:t>
+                </a:r>
+              </a:p>
+            </p:txBody>
+          </p:sp>
+        </mc:Fallback>
+      </mc:AlternateContent>
+      <mc:AlternateContent xmlns:mc="http://schemas.openxmlformats.org/markup-compatibility/2006">
+        <mc:Choice xmlns:a14="http://schemas.microsoft.com/office/drawing/2010/main" Requires="a14">
+          <p:sp>
+            <p:nvSpPr>
+              <p:cNvPr id="17" name="TextBox 16"/>
+              <p:cNvSpPr txBox="1"/>
+              <p:nvPr/>
+            </p:nvSpPr>
+            <p:spPr>
+              <a:xfrm>
+                <a:off x="2783257" y="2646278"/>
+                <a:ext cx="245708" cy="307777"/>
+              </a:xfrm>
+              <a:prstGeom prst="rect">
+                <a:avLst/>
+              </a:prstGeom>
+              <a:noFill/>
+            </p:spPr>
+            <p:txBody>
+              <a:bodyPr wrap="none" lIns="0" tIns="0" rIns="0" bIns="0" rtlCol="0">
+                <a:spAutoFit/>
+              </a:bodyPr>
+              <a:lstStyle/>
+              <a:p>
+                <a14:m>
+                  <m:oMathPara xmlns:m="http://schemas.openxmlformats.org/officeDocument/2006/math">
+                    <m:oMathParaPr>
+                      <m:jc m:val="centerGroup"/>
+                    </m:oMathParaPr>
+                    <m:oMath xmlns:m="http://schemas.openxmlformats.org/officeDocument/2006/math">
+                      <m:r>
+                        <a:rPr lang="en-US" sz="2000" b="0" i="1" smtClean="0">
+                          <a:latin typeface="Cambria Math" panose="02040503050406030204" pitchFamily="18" charset="0"/>
+                          <a:cs typeface="Arial" panose="020B0604020202020204" pitchFamily="34" charset="0"/>
+                        </a:rPr>
+                        <m:t>𝐵</m:t>
+                      </m:r>
+                    </m:oMath>
+                  </m:oMathPara>
+                </a14:m>
+                <a:endParaRPr lang="en-US" sz="2000" dirty="0" smtClean="0">
+                  <a:latin typeface="Arial" panose="020B0604020202020204" pitchFamily="34" charset="0"/>
+                  <a:cs typeface="Arial" panose="020B0604020202020204" pitchFamily="34" charset="0"/>
+                </a:endParaRPr>
+              </a:p>
+            </p:txBody>
+          </p:sp>
+        </mc:Choice>
+        <mc:Fallback>
+          <p:sp>
+            <p:nvSpPr>
+              <p:cNvPr id="17" name="TextBox 16"/>
+              <p:cNvSpPr txBox="1">
+                <a:spLocks noRot="1" noChangeAspect="1" noMove="1" noResize="1" noEditPoints="1" noAdjustHandles="1" noChangeArrowheads="1" noChangeShapeType="1" noTextEdit="1"/>
+              </p:cNvSpPr>
+              <p:nvPr/>
+            </p:nvSpPr>
+            <p:spPr>
+              <a:xfrm>
+                <a:off x="2783257" y="2646278"/>
+                <a:ext cx="245708" cy="307777"/>
+              </a:xfrm>
+              <a:prstGeom prst="rect">
+                <a:avLst/>
+              </a:prstGeom>
+              <a:blipFill>
+                <a:blip r:embed="rId7"/>
+                <a:stretch>
+                  <a:fillRect l="-22500" r="-20000" b="-9804"/>
+                </a:stretch>
+              </a:blipFill>
+            </p:spPr>
+            <p:txBody>
+              <a:bodyPr/>
+              <a:lstStyle/>
+              <a:p>
+                <a:r>
+                  <a:rPr lang="en-US">
+                    <a:noFill/>
+                  </a:rPr>
+                  <a:t> </a:t>
+                </a:r>
+              </a:p>
+            </p:txBody>
+          </p:sp>
+        </mc:Fallback>
+      </mc:AlternateContent>
+      <mc:AlternateContent xmlns:mc="http://schemas.openxmlformats.org/markup-compatibility/2006">
+        <mc:Choice xmlns:a14="http://schemas.microsoft.com/office/drawing/2010/main" Requires="a14">
+          <p:sp>
+            <p:nvSpPr>
+              <p:cNvPr id="18" name="TextBox 17"/>
+              <p:cNvSpPr txBox="1"/>
+              <p:nvPr/>
+            </p:nvSpPr>
+            <p:spPr>
+              <a:xfrm>
+                <a:off x="4169222" y="2646278"/>
+                <a:ext cx="234102" cy="307777"/>
+              </a:xfrm>
+              <a:prstGeom prst="rect">
+                <a:avLst/>
+              </a:prstGeom>
+              <a:noFill/>
+            </p:spPr>
+            <p:txBody>
+              <a:bodyPr wrap="none" lIns="0" tIns="0" rIns="0" bIns="0" rtlCol="0">
+                <a:spAutoFit/>
+              </a:bodyPr>
+              <a:lstStyle/>
+              <a:p>
+                <a14:m>
+                  <m:oMathPara xmlns:m="http://schemas.openxmlformats.org/officeDocument/2006/math">
+                    <m:oMathParaPr>
+                      <m:jc m:val="centerGroup"/>
+                    </m:oMathParaPr>
+                    <m:oMath xmlns:m="http://schemas.openxmlformats.org/officeDocument/2006/math">
+                      <m:r>
+                        <a:rPr lang="en-US" sz="2000" b="0" i="1" smtClean="0">
+                          <a:latin typeface="Cambria Math" panose="02040503050406030204" pitchFamily="18" charset="0"/>
+                          <a:cs typeface="Arial" panose="020B0604020202020204" pitchFamily="34" charset="0"/>
+                        </a:rPr>
+                        <m:t>𝐶</m:t>
+                      </m:r>
+                    </m:oMath>
+                  </m:oMathPara>
+                </a14:m>
+                <a:endParaRPr lang="en-US" sz="2000" dirty="0" smtClean="0">
+                  <a:latin typeface="Arial" panose="020B0604020202020204" pitchFamily="34" charset="0"/>
+                  <a:cs typeface="Arial" panose="020B0604020202020204" pitchFamily="34" charset="0"/>
+                </a:endParaRPr>
+              </a:p>
+            </p:txBody>
+          </p:sp>
+        </mc:Choice>
+        <mc:Fallback>
+          <p:sp>
+            <p:nvSpPr>
+              <p:cNvPr id="18" name="TextBox 17"/>
+              <p:cNvSpPr txBox="1">
+                <a:spLocks noRot="1" noChangeAspect="1" noMove="1" noResize="1" noEditPoints="1" noAdjustHandles="1" noChangeArrowheads="1" noChangeShapeType="1" noTextEdit="1"/>
+              </p:cNvSpPr>
+              <p:nvPr/>
+            </p:nvSpPr>
+            <p:spPr>
+              <a:xfrm>
+                <a:off x="4169222" y="2646278"/>
+                <a:ext cx="234102" cy="307777"/>
+              </a:xfrm>
+              <a:prstGeom prst="rect">
+                <a:avLst/>
+              </a:prstGeom>
+              <a:blipFill>
+                <a:blip r:embed="rId8"/>
+                <a:stretch>
+                  <a:fillRect l="-23684" r="-18421" b="-9804"/>
+                </a:stretch>
+              </a:blipFill>
+            </p:spPr>
+            <p:txBody>
+              <a:bodyPr/>
+              <a:lstStyle/>
+              <a:p>
+                <a:r>
+                  <a:rPr lang="en-US">
+                    <a:noFill/>
+                  </a:rPr>
+                  <a:t> </a:t>
+                </a:r>
+              </a:p>
+            </p:txBody>
+          </p:sp>
+        </mc:Fallback>
+      </mc:AlternateContent>
+    </p:spTree>
+    <p:extLst>
+      <p:ext uri="{BB962C8B-B14F-4D97-AF65-F5344CB8AC3E}">
+        <p14:creationId xmlns:p14="http://schemas.microsoft.com/office/powerpoint/2010/main" val="729009165"/>
       </p:ext>
     </p:extLst>
   </p:cSld>

</xml_diff>